<commit_message>
Signed-off-by: Joseph Catanzarite <jcatanza@users.noreply.github.com>
</commit_message>
<xml_diff>
--- a/meetup_21dec2019.pptx
+++ b/meetup_21dec2019.pptx
@@ -13,6 +13,13 @@
     <p:sldId id="260" r:id="rId8"/>
     <p:sldId id="261" r:id="rId9"/>
     <p:sldId id="262" r:id="rId10"/>
+    <p:sldId id="263" r:id="rId11"/>
+    <p:sldId id="264" r:id="rId12"/>
+    <p:sldId id="265" r:id="rId13"/>
+    <p:sldId id="266" r:id="rId14"/>
+    <p:sldId id="267" r:id="rId15"/>
+    <p:sldId id="268" r:id="rId16"/>
+    <p:sldId id="269" r:id="rId17"/>
   </p:sldIdLst>
   <p:sldSz cx="10080625" cy="5670550"/>
   <p:notesSz cx="7772400" cy="10058400"/>
@@ -2792,16 +2799,17 @@
         </p:spPr>
         <p:txBody>
           <a:bodyPr lIns="0" rIns="0" tIns="0" bIns="0" anchor="ctr">
-            <a:spAutoFit/>
-          </a:bodyPr>
-          <a:p>
-            <a:r>
-              <a:rPr b="0" lang="en-US" sz="1800" spc="-1" strike="noStrike">
+            <a:noAutofit/>
+          </a:bodyPr>
+          <a:p>
+            <a:pPr algn="ctr"/>
+            <a:r>
+              <a:rPr b="0" lang="en-US" sz="4400" spc="-1" strike="noStrike">
                 <a:latin typeface="Arial"/>
               </a:rPr>
               <a:t>Click to edit the title text format</a:t>
             </a:r>
-            <a:endParaRPr b="0" lang="en-US" sz="1800" spc="-1" strike="noStrike">
+            <a:endParaRPr b="0" lang="en-US" sz="4400" spc="-1" strike="noStrike">
               <a:latin typeface="Arial"/>
             </a:endParaRPr>
           </a:p>
@@ -3067,16 +3075,17 @@
         </p:spPr>
         <p:txBody>
           <a:bodyPr lIns="0" rIns="0" tIns="0" bIns="0" anchor="ctr">
-            <a:spAutoFit/>
-          </a:bodyPr>
-          <a:p>
-            <a:r>
-              <a:rPr b="0" lang="en-US" sz="1800" spc="-1" strike="noStrike">
+            <a:noAutofit/>
+          </a:bodyPr>
+          <a:p>
+            <a:pPr algn="ctr"/>
+            <a:r>
+              <a:rPr b="0" lang="en-US" sz="4400" spc="-1" strike="noStrike">
                 <a:latin typeface="Arial"/>
               </a:rPr>
               <a:t>Click to edit the title text format</a:t>
             </a:r>
-            <a:endParaRPr b="0" lang="en-US" sz="1800" spc="-1" strike="noStrike">
+            <a:endParaRPr b="0" lang="en-US" sz="4400" spc="-1" strike="noStrike">
               <a:latin typeface="Arial"/>
             </a:endParaRPr>
           </a:p>
@@ -3118,12 +3127,12 @@
               <a:buChar char=""/>
             </a:pPr>
             <a:r>
-              <a:rPr b="0" lang="en-US" sz="1800" spc="-1" strike="noStrike">
+              <a:rPr b="0" lang="en-US" sz="3200" spc="-1" strike="noStrike">
                 <a:latin typeface="Arial"/>
               </a:rPr>
               <a:t>Click to edit the outline text format</a:t>
             </a:r>
-            <a:endParaRPr b="0" lang="en-US" sz="1800" spc="-1" strike="noStrike">
+            <a:endParaRPr b="0" lang="en-US" sz="3200" spc="-1" strike="noStrike">
               <a:latin typeface="Arial"/>
             </a:endParaRPr>
           </a:p>
@@ -3140,12 +3149,12 @@
               <a:buChar char=""/>
             </a:pPr>
             <a:r>
-              <a:rPr b="0" lang="en-US" sz="1800" spc="-1" strike="noStrike">
+              <a:rPr b="0" lang="en-US" sz="2800" spc="-1" strike="noStrike">
                 <a:latin typeface="Arial"/>
               </a:rPr>
               <a:t>Second Outline Level</a:t>
             </a:r>
-            <a:endParaRPr b="0" lang="en-US" sz="1800" spc="-1" strike="noStrike">
+            <a:endParaRPr b="0" lang="en-US" sz="2800" spc="-1" strike="noStrike">
               <a:latin typeface="Arial"/>
             </a:endParaRPr>
           </a:p>
@@ -3162,12 +3171,12 @@
               <a:buChar char=""/>
             </a:pPr>
             <a:r>
-              <a:rPr b="0" lang="en-US" sz="1800" spc="-1" strike="noStrike">
+              <a:rPr b="0" lang="en-US" sz="2400" spc="-1" strike="noStrike">
                 <a:latin typeface="Arial"/>
               </a:rPr>
               <a:t>Third Outline Level</a:t>
             </a:r>
-            <a:endParaRPr b="0" lang="en-US" sz="1800" spc="-1" strike="noStrike">
+            <a:endParaRPr b="0" lang="en-US" sz="2400" spc="-1" strike="noStrike">
               <a:latin typeface="Arial"/>
             </a:endParaRPr>
           </a:p>
@@ -3184,12 +3193,12 @@
               <a:buChar char=""/>
             </a:pPr>
             <a:r>
-              <a:rPr b="0" lang="en-US" sz="1800" spc="-1" strike="noStrike">
+              <a:rPr b="0" lang="en-US" sz="2000" spc="-1" strike="noStrike">
                 <a:latin typeface="Arial"/>
               </a:rPr>
               <a:t>Fourth Outline Level</a:t>
             </a:r>
-            <a:endParaRPr b="0" lang="en-US" sz="1800" spc="-1" strike="noStrike">
+            <a:endParaRPr b="0" lang="en-US" sz="2000" spc="-1" strike="noStrike">
               <a:latin typeface="Arial"/>
             </a:endParaRPr>
           </a:p>
@@ -3206,12 +3215,12 @@
               <a:buChar char=""/>
             </a:pPr>
             <a:r>
-              <a:rPr b="0" lang="en-US" sz="1800" spc="-1" strike="noStrike">
+              <a:rPr b="0" lang="en-US" sz="2000" spc="-1" strike="noStrike">
                 <a:latin typeface="Arial"/>
               </a:rPr>
               <a:t>Fifth Outline Level</a:t>
             </a:r>
-            <a:endParaRPr b="0" lang="en-US" sz="1800" spc="-1" strike="noStrike">
+            <a:endParaRPr b="0" lang="en-US" sz="2000" spc="-1" strike="noStrike">
               <a:latin typeface="Arial"/>
             </a:endParaRPr>
           </a:p>
@@ -3228,12 +3237,12 @@
               <a:buChar char=""/>
             </a:pPr>
             <a:r>
-              <a:rPr b="0" lang="en-US" sz="1800" spc="-1" strike="noStrike">
+              <a:rPr b="0" lang="en-US" sz="2000" spc="-1" strike="noStrike">
                 <a:latin typeface="Arial"/>
               </a:rPr>
               <a:t>Sixth Outline Level</a:t>
             </a:r>
-            <a:endParaRPr b="0" lang="en-US" sz="1800" spc="-1" strike="noStrike">
+            <a:endParaRPr b="0" lang="en-US" sz="2000" spc="-1" strike="noStrike">
               <a:latin typeface="Arial"/>
             </a:endParaRPr>
           </a:p>
@@ -3250,12 +3259,12 @@
               <a:buChar char=""/>
             </a:pPr>
             <a:r>
-              <a:rPr b="0" lang="en-US" sz="1800" spc="-1" strike="noStrike">
+              <a:rPr b="0" lang="en-US" sz="2000" spc="-1" strike="noStrike">
                 <a:latin typeface="Arial"/>
               </a:rPr>
               <a:t>Seventh Outline Level</a:t>
             </a:r>
-            <a:endParaRPr b="0" lang="en-US" sz="1800" spc="-1" strike="noStrike">
+            <a:endParaRPr b="0" lang="en-US" sz="2000" spc="-1" strike="noStrike">
               <a:latin typeface="Arial"/>
             </a:endParaRPr>
           </a:p>
@@ -3356,8 +3365,8 @@
         </p:nvSpPr>
         <p:spPr>
           <a:xfrm>
-            <a:off x="504000" y="1487880"/>
-            <a:ext cx="9071640" cy="3047760"/>
+            <a:off x="504000" y="2219040"/>
+            <a:ext cx="9071640" cy="1585440"/>
           </a:xfrm>
           <a:prstGeom prst="rect">
             <a:avLst/>
@@ -3387,55 +3396,7 @@
               <a:rPr b="0" lang="en-US" sz="3200" spc="-1" strike="noStrike">
                 <a:latin typeface="Arial"/>
               </a:rPr>
-              <a:t>A New TWiML x fast.ai Study Group</a:t>
-            </a:r>
-            <a:endParaRPr b="0" lang="en-US" sz="3200" spc="-1" strike="noStrike">
-              <a:latin typeface="Arial"/>
-            </a:endParaRPr>
-          </a:p>
-          <a:p>
-            <a:pPr algn="ctr">
-              <a:lnSpc>
-                <a:spcPct val="100000"/>
-              </a:lnSpc>
-            </a:pPr>
-            <a:r>
-              <a:rPr b="0" lang="en-US" sz="3200" spc="-1" strike="noStrike">
-                <a:latin typeface="Arial"/>
-              </a:rPr>
-              <a:t>Based on the course </a:t>
-            </a:r>
-            <a:endParaRPr b="0" lang="en-US" sz="3200" spc="-1" strike="noStrike">
-              <a:latin typeface="Arial"/>
-            </a:endParaRPr>
-          </a:p>
-          <a:p>
-            <a:pPr algn="ctr">
-              <a:lnSpc>
-                <a:spcPct val="100000"/>
-              </a:lnSpc>
-            </a:pPr>
-            <a:r>
-              <a:rPr b="0" lang="en-US" sz="3200" spc="-1" strike="noStrike">
-                <a:latin typeface="Arial"/>
-              </a:rPr>
-              <a:t>created by Rachel Thomas, </a:t>
-            </a:r>
-            <a:endParaRPr b="0" lang="en-US" sz="3200" spc="-1" strike="noStrike">
-              <a:latin typeface="Arial"/>
-            </a:endParaRPr>
-          </a:p>
-          <a:p>
-            <a:pPr algn="ctr">
-              <a:lnSpc>
-                <a:spcPct val="100000"/>
-              </a:lnSpc>
-            </a:pPr>
-            <a:r>
-              <a:rPr b="0" lang="en-US" sz="3200" spc="-1" strike="noStrike">
-                <a:latin typeface="Arial"/>
-              </a:rPr>
-              <a:t>co-founder of fast.ai</a:t>
+              <a:t>Lesson 2: Topic Modeling With NMF and SVD</a:t>
             </a:r>
             <a:endParaRPr b="0" lang="en-US" sz="3200" spc="-1" strike="noStrike">
               <a:latin typeface="Arial"/>
@@ -3485,6 +3446,434 @@
           </a:p>
         </p:txBody>
       </p:sp>
+    </p:spTree>
+  </p:cSld>
+  <mc:AlternateContent>
+    <mc:Choice Requires="p14">
+      <p:transition spd="slow" p14:dur="2000"/>
+    </mc:Choice>
+    <mc:Fallback>
+      <p:transition spd="slow"/>
+    </mc:Fallback>
+  </mc:AlternateContent>
+</p:sld>
+</file>
+
+<file path=ppt/slides/slide10.xml><?xml version="1.0" encoding="utf-8"?>
+<p:sld xmlns:a="http://schemas.openxmlformats.org/drawingml/2006/main" xmlns:p="http://schemas.openxmlformats.org/presentationml/2006/main" xmlns:r="http://schemas.openxmlformats.org/officeDocument/2006/relationships" xmlns:p14="http://schemas.microsoft.com/office/powerpoint/2010/main" xmlns:p15="http://schemas.microsoft.com/office/powerpoint/2012/main" xmlns:mc="http://schemas.openxmlformats.org/markup-compatibility/2006">
+  <p:cSld>
+    <p:spTree>
+      <p:nvGrpSpPr>
+        <p:cNvPr id="1" name=""/>
+        <p:cNvGrpSpPr/>
+        <p:nvPr/>
+      </p:nvGrpSpPr>
+      <p:grpSpPr>
+        <a:xfrm>
+          <a:off x="0" y="0"/>
+          <a:ext cx="0" cy="0"/>
+          <a:chOff x="0" y="0"/>
+          <a:chExt cx="0" cy="0"/>
+        </a:xfrm>
+      </p:grpSpPr>
+      <p:sp>
+        <p:nvSpPr>
+          <p:cNvPr id="95" name="TextShape 1"/>
+          <p:cNvSpPr txBox="1"/>
+          <p:nvPr/>
+        </p:nvSpPr>
+        <p:spPr>
+          <a:xfrm>
+            <a:off x="504000" y="210600"/>
+            <a:ext cx="7019640" cy="946800"/>
+          </a:xfrm>
+          <a:prstGeom prst="rect">
+            <a:avLst/>
+          </a:prstGeom>
+          <a:noFill/>
+          <a:ln>
+            <a:noFill/>
+          </a:ln>
+        </p:spPr>
+        <p:txBody>
+          <a:bodyPr lIns="0" rIns="0" tIns="0" bIns="0" anchor="ctr">
+            <a:spAutoFit/>
+          </a:bodyPr>
+          <a:p>
+            <a:pPr algn="ctr"/>
+            <a:r>
+              <a:rPr b="0" lang="en-US" sz="4000" spc="-1" strike="noStrike">
+                <a:latin typeface="Arial"/>
+              </a:rPr>
+              <a:t>Matrix Factorization Examples</a:t>
+            </a:r>
+            <a:endParaRPr b="0" lang="en-US" sz="4000" spc="-1" strike="noStrike">
+              <a:latin typeface="Arial"/>
+            </a:endParaRPr>
+          </a:p>
+        </p:txBody>
+      </p:sp>
+      <p:sp>
+        <p:nvSpPr>
+          <p:cNvPr id="96" name="TextShape 2"/>
+          <p:cNvSpPr txBox="1"/>
+          <p:nvPr/>
+        </p:nvSpPr>
+        <p:spPr>
+          <a:xfrm>
+            <a:off x="504000" y="1368000"/>
+            <a:ext cx="9071640" cy="3287880"/>
+          </a:xfrm>
+          <a:prstGeom prst="rect">
+            <a:avLst/>
+          </a:prstGeom>
+          <a:noFill/>
+          <a:ln>
+            <a:noFill/>
+          </a:ln>
+        </p:spPr>
+        <p:txBody>
+          <a:bodyPr lIns="0" rIns="0" tIns="0" bIns="0">
+            <a:normAutofit/>
+          </a:bodyPr>
+          <a:p>
+            <a:pPr marL="432000" indent="-324000">
+              <a:spcBef>
+                <a:spcPts val="1417"/>
+              </a:spcBef>
+              <a:buClr>
+                <a:srgbClr val="000000"/>
+              </a:buClr>
+              <a:buSzPct val="45000"/>
+              <a:buFont typeface="Wingdings" charset="2"/>
+              <a:buChar char=""/>
+            </a:pPr>
+            <a:r>
+              <a:rPr b="0" lang="en-US" sz="3200" spc="-1" strike="noStrike">
+                <a:latin typeface="Arial"/>
+              </a:rPr>
+              <a:t>Refer to spreadsheet britlit.xlsx</a:t>
+            </a:r>
+            <a:endParaRPr b="0" lang="en-US" sz="3200" spc="-1" strike="noStrike">
+              <a:latin typeface="Arial"/>
+            </a:endParaRPr>
+          </a:p>
+        </p:txBody>
+      </p:sp>
+    </p:spTree>
+  </p:cSld>
+  <mc:AlternateContent>
+    <mc:Choice Requires="p14">
+      <p:transition spd="slow" p14:dur="2000"/>
+    </mc:Choice>
+    <mc:Fallback>
+      <p:transition spd="slow"/>
+    </mc:Fallback>
+  </mc:AlternateContent>
+</p:sld>
+</file>
+
+<file path=ppt/slides/slide11.xml><?xml version="1.0" encoding="utf-8"?>
+<p:sld xmlns:a="http://schemas.openxmlformats.org/drawingml/2006/main" xmlns:p="http://schemas.openxmlformats.org/presentationml/2006/main" xmlns:r="http://schemas.openxmlformats.org/officeDocument/2006/relationships" xmlns:p14="http://schemas.microsoft.com/office/powerpoint/2010/main" xmlns:p15="http://schemas.microsoft.com/office/powerpoint/2012/main" xmlns:mc="http://schemas.openxmlformats.org/markup-compatibility/2006">
+  <p:cSld>
+    <p:spTree>
+      <p:nvGrpSpPr>
+        <p:cNvPr id="1" name=""/>
+        <p:cNvGrpSpPr/>
+        <p:nvPr/>
+      </p:nvGrpSpPr>
+      <p:grpSpPr>
+        <a:xfrm>
+          <a:off x="0" y="0"/>
+          <a:ext cx="0" cy="0"/>
+          <a:chOff x="0" y="0"/>
+          <a:chExt cx="0" cy="0"/>
+        </a:xfrm>
+      </p:grpSpPr>
+      <p:sp>
+        <p:nvSpPr>
+          <p:cNvPr id="97" name="TextShape 1"/>
+          <p:cNvSpPr txBox="1"/>
+          <p:nvPr/>
+        </p:nvSpPr>
+        <p:spPr>
+          <a:xfrm>
+            <a:off x="504000" y="210600"/>
+            <a:ext cx="7019640" cy="946800"/>
+          </a:xfrm>
+          <a:prstGeom prst="rect">
+            <a:avLst/>
+          </a:prstGeom>
+          <a:noFill/>
+          <a:ln>
+            <a:noFill/>
+          </a:ln>
+        </p:spPr>
+        <p:txBody>
+          <a:bodyPr lIns="0" rIns="0" tIns="0" bIns="0" anchor="ctr">
+            <a:spAutoFit/>
+          </a:bodyPr>
+          <a:p>
+            <a:pPr algn="ctr"/>
+            <a:r>
+              <a:rPr b="0" lang="en-US" sz="4400" spc="-1" strike="noStrike">
+                <a:latin typeface="Arial"/>
+              </a:rPr>
+              <a:t>TF-IDF</a:t>
+            </a:r>
+            <a:endParaRPr b="0" lang="en-US" sz="4400" spc="-1" strike="noStrike">
+              <a:latin typeface="Arial"/>
+            </a:endParaRPr>
+          </a:p>
+        </p:txBody>
+      </p:sp>
+    </p:spTree>
+  </p:cSld>
+  <mc:AlternateContent>
+    <mc:Choice Requires="p14">
+      <p:transition spd="slow" p14:dur="2000"/>
+    </mc:Choice>
+    <mc:Fallback>
+      <p:transition spd="slow"/>
+    </mc:Fallback>
+  </mc:AlternateContent>
+</p:sld>
+</file>
+
+<file path=ppt/slides/slide12.xml><?xml version="1.0" encoding="utf-8"?>
+<p:sld xmlns:a="http://schemas.openxmlformats.org/drawingml/2006/main" xmlns:p="http://schemas.openxmlformats.org/presentationml/2006/main" xmlns:r="http://schemas.openxmlformats.org/officeDocument/2006/relationships" xmlns:p14="http://schemas.microsoft.com/office/powerpoint/2010/main" xmlns:p15="http://schemas.microsoft.com/office/powerpoint/2012/main" xmlns:mc="http://schemas.openxmlformats.org/markup-compatibility/2006">
+  <p:cSld>
+    <p:spTree>
+      <p:nvGrpSpPr>
+        <p:cNvPr id="1" name=""/>
+        <p:cNvGrpSpPr/>
+        <p:nvPr/>
+      </p:nvGrpSpPr>
+      <p:grpSpPr>
+        <a:xfrm>
+          <a:off x="0" y="0"/>
+          <a:ext cx="0" cy="0"/>
+          <a:chOff x="0" y="0"/>
+          <a:chExt cx="0" cy="0"/>
+        </a:xfrm>
+      </p:grpSpPr>
+      <p:sp>
+        <p:nvSpPr>
+          <p:cNvPr id="98" name="TextShape 1"/>
+          <p:cNvSpPr txBox="1"/>
+          <p:nvPr/>
+        </p:nvSpPr>
+        <p:spPr>
+          <a:xfrm>
+            <a:off x="504000" y="210600"/>
+            <a:ext cx="7019640" cy="946800"/>
+          </a:xfrm>
+          <a:prstGeom prst="rect">
+            <a:avLst/>
+          </a:prstGeom>
+          <a:noFill/>
+          <a:ln>
+            <a:noFill/>
+          </a:ln>
+        </p:spPr>
+        <p:txBody>
+          <a:bodyPr lIns="0" rIns="0" tIns="0" bIns="0" anchor="ctr">
+            <a:spAutoFit/>
+          </a:bodyPr>
+          <a:p>
+            <a:pPr algn="ctr"/>
+            <a:r>
+              <a:rPr b="0" lang="en-US" sz="4400" spc="-1" strike="noStrike">
+                <a:latin typeface="Arial"/>
+              </a:rPr>
+              <a:t>Appendix</a:t>
+            </a:r>
+            <a:endParaRPr b="0" lang="en-US" sz="4400" spc="-1" strike="noStrike">
+              <a:latin typeface="Arial"/>
+            </a:endParaRPr>
+          </a:p>
+        </p:txBody>
+      </p:sp>
+    </p:spTree>
+  </p:cSld>
+  <mc:AlternateContent>
+    <mc:Choice Requires="p14">
+      <p:transition spd="slow" p14:dur="2000"/>
+    </mc:Choice>
+    <mc:Fallback>
+      <p:transition spd="slow"/>
+    </mc:Fallback>
+  </mc:AlternateContent>
+</p:sld>
+</file>
+
+<file path=ppt/slides/slide13.xml><?xml version="1.0" encoding="utf-8"?>
+<p:sld xmlns:a="http://schemas.openxmlformats.org/drawingml/2006/main" xmlns:p="http://schemas.openxmlformats.org/presentationml/2006/main" xmlns:r="http://schemas.openxmlformats.org/officeDocument/2006/relationships" xmlns:p14="http://schemas.microsoft.com/office/powerpoint/2010/main" xmlns:p15="http://schemas.microsoft.com/office/powerpoint/2012/main" xmlns:mc="http://schemas.openxmlformats.org/markup-compatibility/2006">
+  <p:cSld>
+    <p:spTree>
+      <p:nvGrpSpPr>
+        <p:cNvPr id="1" name=""/>
+        <p:cNvGrpSpPr/>
+        <p:nvPr/>
+      </p:nvGrpSpPr>
+      <p:grpSpPr>
+        <a:xfrm>
+          <a:off x="0" y="0"/>
+          <a:ext cx="0" cy="0"/>
+          <a:chOff x="0" y="0"/>
+          <a:chExt cx="0" cy="0"/>
+        </a:xfrm>
+      </p:grpSpPr>
+      <p:sp>
+        <p:nvSpPr>
+          <p:cNvPr id="99" name="TextShape 1"/>
+          <p:cNvSpPr txBox="1"/>
+          <p:nvPr/>
+        </p:nvSpPr>
+        <p:spPr>
+          <a:xfrm>
+            <a:off x="504000" y="210600"/>
+            <a:ext cx="7019640" cy="946800"/>
+          </a:xfrm>
+          <a:prstGeom prst="rect">
+            <a:avLst/>
+          </a:prstGeom>
+          <a:noFill/>
+          <a:ln>
+            <a:noFill/>
+          </a:ln>
+        </p:spPr>
+        <p:txBody>
+          <a:bodyPr lIns="0" rIns="0" tIns="0" bIns="0" anchor="ctr">
+            <a:spAutoFit/>
+          </a:bodyPr>
+          <a:p>
+            <a:pPr algn="ctr"/>
+            <a:r>
+              <a:rPr b="0" lang="en-US" sz="4400" spc="-1" strike="noStrike">
+                <a:latin typeface="Arial"/>
+              </a:rPr>
+              <a:t>SVD Equation</a:t>
+            </a:r>
+            <a:endParaRPr b="0" lang="en-US" sz="4400" spc="-1" strike="noStrike">
+              <a:latin typeface="Arial"/>
+            </a:endParaRPr>
+          </a:p>
+        </p:txBody>
+      </p:sp>
+      <p:pic>
+        <p:nvPicPr>
+          <p:cNvPr id="100" name="" descr=""/>
+          <p:cNvPicPr/>
+          <p:nvPr/>
+        </p:nvPicPr>
+        <p:blipFill>
+          <a:blip r:embed="rId1"/>
+          <a:stretch/>
+        </p:blipFill>
+        <p:spPr>
+          <a:xfrm>
+            <a:off x="1699920" y="1367640"/>
+            <a:ext cx="5818320" cy="4041000"/>
+          </a:xfrm>
+          <a:prstGeom prst="rect">
+            <a:avLst/>
+          </a:prstGeom>
+          <a:ln>
+            <a:noFill/>
+          </a:ln>
+        </p:spPr>
+      </p:pic>
+    </p:spTree>
+  </p:cSld>
+  <mc:AlternateContent>
+    <mc:Choice Requires="p14">
+      <p:transition spd="slow" p14:dur="2000"/>
+    </mc:Choice>
+    <mc:Fallback>
+      <p:transition spd="slow"/>
+    </mc:Fallback>
+  </mc:AlternateContent>
+</p:sld>
+</file>
+
+<file path=ppt/slides/slide14.xml><?xml version="1.0" encoding="utf-8"?>
+<p:sld xmlns:a="http://schemas.openxmlformats.org/drawingml/2006/main" xmlns:p="http://schemas.openxmlformats.org/presentationml/2006/main" xmlns:r="http://schemas.openxmlformats.org/officeDocument/2006/relationships" xmlns:p14="http://schemas.microsoft.com/office/powerpoint/2010/main" xmlns:p15="http://schemas.microsoft.com/office/powerpoint/2012/main" xmlns:mc="http://schemas.openxmlformats.org/markup-compatibility/2006">
+  <p:cSld>
+    <p:spTree>
+      <p:nvGrpSpPr>
+        <p:cNvPr id="1" name=""/>
+        <p:cNvGrpSpPr/>
+        <p:nvPr/>
+      </p:nvGrpSpPr>
+      <p:grpSpPr>
+        <a:xfrm>
+          <a:off x="0" y="0"/>
+          <a:ext cx="0" cy="0"/>
+          <a:chOff x="0" y="0"/>
+          <a:chExt cx="0" cy="0"/>
+        </a:xfrm>
+      </p:grpSpPr>
+      <p:sp>
+        <p:nvSpPr>
+          <p:cNvPr id="101" name="TextShape 1"/>
+          <p:cNvSpPr txBox="1"/>
+          <p:nvPr/>
+        </p:nvSpPr>
+        <p:spPr>
+          <a:xfrm>
+            <a:off x="504000" y="210600"/>
+            <a:ext cx="7019640" cy="946800"/>
+          </a:xfrm>
+          <a:prstGeom prst="rect">
+            <a:avLst/>
+          </a:prstGeom>
+          <a:noFill/>
+          <a:ln>
+            <a:noFill/>
+          </a:ln>
+        </p:spPr>
+        <p:txBody>
+          <a:bodyPr lIns="0" rIns="0" tIns="0" bIns="0" anchor="ctr">
+            <a:spAutoFit/>
+          </a:bodyPr>
+          <a:p>
+            <a:pPr algn="ctr"/>
+            <a:r>
+              <a:rPr b="0" lang="en-US" sz="4400" spc="-1" strike="noStrike">
+                <a:latin typeface="Arial"/>
+              </a:rPr>
+              <a:t>Word2vec concept</a:t>
+            </a:r>
+            <a:endParaRPr b="0" lang="en-US" sz="4400" spc="-1" strike="noStrike">
+              <a:latin typeface="Arial"/>
+            </a:endParaRPr>
+          </a:p>
+        </p:txBody>
+      </p:sp>
+      <p:pic>
+        <p:nvPicPr>
+          <p:cNvPr id="102" name="" descr=""/>
+          <p:cNvPicPr/>
+          <p:nvPr/>
+        </p:nvPicPr>
+        <p:blipFill>
+          <a:blip r:embed="rId1"/>
+          <a:stretch/>
+        </p:blipFill>
+        <p:spPr>
+          <a:xfrm>
+            <a:off x="1929600" y="1617120"/>
+            <a:ext cx="5501160" cy="3794400"/>
+          </a:xfrm>
+          <a:prstGeom prst="rect">
+            <a:avLst/>
+          </a:prstGeom>
+          <a:ln>
+            <a:noFill/>
+          </a:ln>
+        </p:spPr>
+      </p:pic>
     </p:spTree>
   </p:cSld>
   <mc:AlternateContent>
@@ -3592,7 +3981,7 @@
         </p:style>
         <p:txBody>
           <a:bodyPr lIns="0" rIns="0" tIns="0" bIns="0">
-            <a:normAutofit fontScale="91000"/>
+            <a:normAutofit/>
           </a:bodyPr>
           <a:p>
             <a:pPr marL="432000" indent="-323640">
@@ -3613,163 +4002,7 @@
               <a:rPr b="0" lang="en-US" sz="2600" spc="-1" strike="noStrike">
                 <a:latin typeface="Arial"/>
               </a:rPr>
-              <a:t>Excited to be here, hope you are too!</a:t>
-            </a:r>
-            <a:endParaRPr b="0" lang="en-US" sz="2600" spc="-1" strike="noStrike">
-              <a:latin typeface="Arial"/>
-            </a:endParaRPr>
-          </a:p>
-          <a:p>
-            <a:pPr marL="432000" indent="-323640">
-              <a:lnSpc>
-                <a:spcPct val="100000"/>
-              </a:lnSpc>
-              <a:spcAft>
-                <a:spcPts val="1148"/>
-              </a:spcAft>
-              <a:buClr>
-                <a:srgbClr val="000000"/>
-              </a:buClr>
-              <a:buSzPct val="45000"/>
-              <a:buFont typeface="Wingdings" charset="2"/>
-              <a:buChar char=""/>
-            </a:pPr>
-            <a:r>
-              <a:rPr b="0" lang="en-US" sz="2600" spc="-1" strike="noStrike">
-                <a:latin typeface="Arial"/>
-              </a:rPr>
-              <a:t>How to make Learning Online work</a:t>
-            </a:r>
-            <a:endParaRPr b="0" lang="en-US" sz="2600" spc="-1" strike="noStrike">
-              <a:latin typeface="Arial"/>
-            </a:endParaRPr>
-          </a:p>
-          <a:p>
-            <a:pPr marL="432000" indent="-323640">
-              <a:lnSpc>
-                <a:spcPct val="100000"/>
-              </a:lnSpc>
-              <a:spcAft>
-                <a:spcPts val="1148"/>
-              </a:spcAft>
-              <a:buClr>
-                <a:srgbClr val="000000"/>
-              </a:buClr>
-              <a:buSzPct val="45000"/>
-              <a:buFont typeface="Wingdings" charset="2"/>
-              <a:buChar char=""/>
-            </a:pPr>
-            <a:r>
-              <a:rPr b="0" lang="en-US" sz="2600" spc="-1" strike="noStrike">
-                <a:latin typeface="Arial"/>
-              </a:rPr>
-              <a:t>Course prerequisites</a:t>
-            </a:r>
-            <a:endParaRPr b="0" lang="en-US" sz="2600" spc="-1" strike="noStrike">
-              <a:latin typeface="Arial"/>
-            </a:endParaRPr>
-          </a:p>
-          <a:p>
-            <a:pPr marL="432000" indent="-323640">
-              <a:lnSpc>
-                <a:spcPct val="100000"/>
-              </a:lnSpc>
-              <a:spcAft>
-                <a:spcPts val="1148"/>
-              </a:spcAft>
-              <a:buClr>
-                <a:srgbClr val="000000"/>
-              </a:buClr>
-              <a:buSzPct val="45000"/>
-              <a:buFont typeface="Wingdings" charset="2"/>
-              <a:buChar char=""/>
-            </a:pPr>
-            <a:r>
-              <a:rPr b="0" lang="en-US" sz="2600" spc="-1" strike="noStrike">
-                <a:latin typeface="Arial"/>
-              </a:rPr>
-              <a:t>Compute infrastructure, running course notebooks </a:t>
-            </a:r>
-            <a:endParaRPr b="0" lang="en-US" sz="2600" spc="-1" strike="noStrike">
-              <a:latin typeface="Arial"/>
-            </a:endParaRPr>
-          </a:p>
-          <a:p>
-            <a:pPr marL="432000" indent="-323640">
-              <a:lnSpc>
-                <a:spcPct val="100000"/>
-              </a:lnSpc>
-              <a:spcAft>
-                <a:spcPts val="1148"/>
-              </a:spcAft>
-              <a:buClr>
-                <a:srgbClr val="000000"/>
-              </a:buClr>
-              <a:buSzPct val="45000"/>
-              <a:buFont typeface="Wingdings" charset="2"/>
-              <a:buChar char=""/>
-            </a:pPr>
-            <a:r>
-              <a:rPr b="0" lang="en-US" sz="2600" spc="-1" strike="noStrike">
-                <a:latin typeface="Arial"/>
-              </a:rPr>
-              <a:t>“</a:t>
-            </a:r>
-            <a:r>
-              <a:rPr b="0" lang="en-US" sz="2600" spc="-1" strike="noStrike">
-                <a:latin typeface="Arial"/>
-              </a:rPr>
-              <a:t>Top-down approach” and how to make it work for you</a:t>
-            </a:r>
-            <a:endParaRPr b="0" lang="en-US" sz="2600" spc="-1" strike="noStrike">
-              <a:latin typeface="Arial"/>
-            </a:endParaRPr>
-          </a:p>
-          <a:p>
-            <a:pPr marL="432000" indent="-323640">
-              <a:lnSpc>
-                <a:spcPct val="100000"/>
-              </a:lnSpc>
-              <a:spcAft>
-                <a:spcPts val="1148"/>
-              </a:spcAft>
-              <a:buClr>
-                <a:srgbClr val="000000"/>
-              </a:buClr>
-              <a:buSzPct val="45000"/>
-              <a:buFont typeface="Wingdings" charset="2"/>
-              <a:buChar char=""/>
-            </a:pPr>
-            <a:r>
-              <a:rPr b="0" lang="en-US" sz="2600" spc="-1" strike="noStrike">
-                <a:latin typeface="Arial"/>
-              </a:rPr>
-              <a:t>Topics to be covered</a:t>
-            </a:r>
-            <a:endParaRPr b="0" lang="en-US" sz="2600" spc="-1" strike="noStrike">
-              <a:latin typeface="Arial"/>
-            </a:endParaRPr>
-          </a:p>
-          <a:p>
-            <a:pPr marL="432000" indent="-323640">
-              <a:lnSpc>
-                <a:spcPct val="100000"/>
-              </a:lnSpc>
-              <a:spcAft>
-                <a:spcPts val="1148"/>
-              </a:spcAft>
-              <a:buClr>
-                <a:srgbClr val="000000"/>
-              </a:buClr>
-              <a:buSzPct val="45000"/>
-              <a:buFont typeface="Wingdings" charset="2"/>
-              <a:buChar char=""/>
-            </a:pPr>
-            <a:r>
-              <a:rPr b="0" lang="en-US" sz="2600" spc="-1" strike="noStrike">
-                <a:latin typeface="Arial"/>
-              </a:rPr>
-              <a:t>Optional assignment: write a blog post</a:t>
+              <a:t>xxx</a:t>
             </a:r>
             <a:endParaRPr b="0" lang="en-US" sz="2600" spc="-1" strike="noStrike">
               <a:latin typeface="Arial"/>
@@ -3849,7 +4082,7 @@
                 </a:solidFill>
                 <a:latin typeface="Arial"/>
               </a:rPr>
-              <a:t>Topics covered</a:t>
+              <a:t>Set up your compute infrastructure</a:t>
             </a:r>
             <a:endParaRPr b="0" lang="en-US" sz="3570" spc="-1" strike="noStrike">
               <a:latin typeface="Arial"/>
@@ -3865,8 +4098,8 @@
         </p:nvSpPr>
         <p:spPr>
           <a:xfrm>
-            <a:off x="504000" y="1368000"/>
-            <a:ext cx="9071640" cy="3287880"/>
+            <a:off x="504000" y="1404360"/>
+            <a:ext cx="9240120" cy="4031640"/>
           </a:xfrm>
           <a:prstGeom prst="rect">
             <a:avLst/>
@@ -3884,225 +4117,531 @@
         </p:style>
         <p:txBody>
           <a:bodyPr lIns="0" rIns="0" tIns="0" bIns="0">
-            <a:normAutofit fontScale="51000"/>
-          </a:bodyPr>
-          <a:p>
-            <a:pPr marL="432000" indent="-323640">
+            <a:normAutofit fontScale="63000"/>
+          </a:bodyPr>
+          <a:p>
+            <a:pPr>
               <a:lnSpc>
                 <a:spcPct val="100000"/>
               </a:lnSpc>
               <a:spcAft>
                 <a:spcPts val="1148"/>
               </a:spcAft>
-              <a:buClr>
-                <a:srgbClr val="000000"/>
-              </a:buClr>
-              <a:buSzPct val="45000"/>
-              <a:buFont typeface="Wingdings" charset="2"/>
-              <a:buChar char=""/>
             </a:pPr>
             <a:r>
-              <a:rPr b="0" lang="en-US" sz="2600" spc="-1" strike="noStrike">
-                <a:latin typeface="Arial"/>
-              </a:rPr>
-              <a:t>Topic Modeling with NMF (non-negative matrix factorization)and SVD (Singular Value Decomposition)</a:t>
-            </a:r>
-            <a:endParaRPr b="0" lang="en-US" sz="2600" spc="-1" strike="noStrike">
-              <a:latin typeface="Arial"/>
-            </a:endParaRPr>
-          </a:p>
-          <a:p>
-            <a:pPr marL="432000" indent="-323640">
+              <a:rPr b="0" lang="en-US" sz="1200" spc="-1" strike="noStrike">
+                <a:latin typeface="Arial"/>
+              </a:rPr>
+              <a:t>1. </a:t>
+            </a:r>
+            <a:r>
+              <a:rPr b="1" lang="en-US" sz="1200" spc="-1" strike="noStrike">
+                <a:latin typeface="Arial"/>
+              </a:rPr>
+              <a:t>Download the Anaconda Python 3.7 distribution at</a:t>
+            </a:r>
+            <a:endParaRPr b="0" lang="en-US" sz="1200" spc="-1" strike="noStrike">
+              <a:latin typeface="Arial"/>
+            </a:endParaRPr>
+          </a:p>
+          <a:p>
+            <a:pPr>
               <a:lnSpc>
                 <a:spcPct val="100000"/>
               </a:lnSpc>
               <a:spcAft>
                 <a:spcPts val="1148"/>
               </a:spcAft>
-              <a:buClr>
-                <a:srgbClr val="000000"/>
-              </a:buClr>
-              <a:buSzPct val="45000"/>
-              <a:buFont typeface="Wingdings" charset="2"/>
-              <a:buChar char=""/>
             </a:pPr>
             <a:r>
-              <a:rPr b="0" lang="en-US" sz="2600" spc="-1" strike="noStrike">
-                <a:latin typeface="Arial"/>
-              </a:rPr>
-              <a:t>Sentiment classification with Naive Bayes, Logistic regression, and ngrams</a:t>
-            </a:r>
-            <a:endParaRPr b="0" lang="en-US" sz="2600" spc="-1" strike="noStrike">
-              <a:latin typeface="Arial"/>
-            </a:endParaRPr>
-          </a:p>
-          <a:p>
-            <a:pPr marL="432000" indent="-323640">
+              <a:rPr b="1" lang="en-US" sz="1200" spc="-1" strike="noStrike">
+                <a:latin typeface="Arial"/>
+              </a:rPr>
+              <a:t>    </a:t>
+            </a:r>
+            <a:r>
+              <a:rPr b="1" lang="en-US" sz="1200" spc="-1" strike="noStrike">
+                <a:solidFill>
+                  <a:srgbClr val="000000"/>
+                </a:solidFill>
+                <a:latin typeface="Lucida Console"/>
+              </a:rPr>
+              <a:t>https://www.anaconda.com/distribution/#download-section</a:t>
+            </a:r>
+            <a:endParaRPr b="0" lang="en-US" sz="1200" spc="-1" strike="noStrike">
+              <a:latin typeface="Arial"/>
+            </a:endParaRPr>
+          </a:p>
+          <a:p>
+            <a:pPr>
               <a:lnSpc>
                 <a:spcPct val="100000"/>
               </a:lnSpc>
               <a:spcAft>
                 <a:spcPts val="1148"/>
               </a:spcAft>
-              <a:buClr>
-                <a:srgbClr val="000000"/>
-              </a:buClr>
-              <a:buSzPct val="45000"/>
-              <a:buFont typeface="Wingdings" charset="2"/>
-              <a:buChar char=""/>
             </a:pPr>
             <a:r>
-              <a:rPr b="0" lang="en-US" sz="2600" spc="-1" strike="noStrike">
-                <a:latin typeface="Arial"/>
-              </a:rPr>
-              <a:t>Regex and tokenization</a:t>
-            </a:r>
-            <a:endParaRPr b="0" lang="en-US" sz="2600" spc="-1" strike="noStrike">
-              <a:latin typeface="Arial"/>
-            </a:endParaRPr>
-          </a:p>
-          <a:p>
-            <a:pPr marL="432000" indent="-323640">
+              <a:rPr b="1" lang="en-US" sz="1200" spc="-1" strike="noStrike">
+                <a:solidFill>
+                  <a:srgbClr val="000000"/>
+                </a:solidFill>
+                <a:latin typeface="Arial"/>
+              </a:rPr>
+              <a:t>2. Install Anaconda by following the instructions at </a:t>
+            </a:r>
+            <a:endParaRPr b="0" lang="en-US" sz="1200" spc="-1" strike="noStrike">
+              <a:latin typeface="Arial"/>
+            </a:endParaRPr>
+          </a:p>
+          <a:p>
+            <a:pPr>
               <a:lnSpc>
                 <a:spcPct val="100000"/>
               </a:lnSpc>
               <a:spcAft>
                 <a:spcPts val="1148"/>
               </a:spcAft>
-              <a:buClr>
-                <a:srgbClr val="000000"/>
-              </a:buClr>
-              <a:buSzPct val="45000"/>
-              <a:buFont typeface="Wingdings" charset="2"/>
-              <a:buChar char=""/>
             </a:pPr>
             <a:r>
-              <a:rPr b="0" lang="en-US" sz="2600" spc="-1" strike="noStrike">
-                <a:latin typeface="Arial"/>
-              </a:rPr>
-              <a:t>Language modeling &amp; sentiment classification with deep learning</a:t>
-            </a:r>
-            <a:endParaRPr b="0" lang="en-US" sz="2600" spc="-1" strike="noStrike">
-              <a:latin typeface="Arial"/>
-            </a:endParaRPr>
-          </a:p>
-          <a:p>
-            <a:pPr marL="432000" indent="-323640">
+              <a:rPr b="1" lang="en-US" sz="1200" spc="-1" strike="noStrike">
+                <a:solidFill>
+                  <a:srgbClr val="000000"/>
+                </a:solidFill>
+                <a:latin typeface="Lucida Console"/>
+              </a:rPr>
+              <a:t>  </a:t>
+            </a:r>
+            <a:r>
+              <a:rPr b="1" lang="en-US" sz="1200" spc="-1" strike="noStrike" u="sng">
+                <a:solidFill>
+                  <a:srgbClr val="0000ff"/>
+                </a:solidFill>
+                <a:uFillTx/>
+                <a:latin typeface="Lucida Console"/>
+                <a:hlinkClick r:id="rId1"/>
+              </a:rPr>
+              <a:t>https://docs.anaconda.com/anaconda/install/</a:t>
+            </a:r>
+            <a:endParaRPr b="0" lang="en-US" sz="1200" spc="-1" strike="noStrike">
+              <a:latin typeface="Arial"/>
+            </a:endParaRPr>
+          </a:p>
+          <a:p>
+            <a:pPr>
               <a:lnSpc>
                 <a:spcPct val="100000"/>
               </a:lnSpc>
               <a:spcAft>
                 <a:spcPts val="1148"/>
               </a:spcAft>
-              <a:buClr>
-                <a:srgbClr val="000000"/>
-              </a:buClr>
-              <a:buSzPct val="45000"/>
-              <a:buFont typeface="Wingdings" charset="2"/>
-              <a:buChar char=""/>
             </a:pPr>
             <a:r>
-              <a:rPr b="0" lang="en-US" sz="2600" spc="-1" strike="noStrike">
-                <a:latin typeface="Arial"/>
-              </a:rPr>
-              <a:t>Translation with Recurrent Neural Networks</a:t>
-            </a:r>
-            <a:endParaRPr b="0" lang="en-US" sz="2600" spc="-1" strike="noStrike">
-              <a:latin typeface="Arial"/>
-            </a:endParaRPr>
-          </a:p>
-          <a:p>
-            <a:pPr marL="432000" indent="-323640">
+              <a:rPr b="1" lang="en-US" sz="1200" spc="-1" strike="noStrike">
+                <a:solidFill>
+                  <a:srgbClr val="0000ff"/>
+                </a:solidFill>
+                <a:latin typeface="Lucida Sans Unicode"/>
+              </a:rPr>
+              <a:t>2. Open an anaconda shell terminal (choose the Anaconda Prompt from the Start Menu in Windows)</a:t>
+            </a:r>
+            <a:endParaRPr b="0" lang="en-US" sz="1200" spc="-1" strike="noStrike">
+              <a:latin typeface="Arial"/>
+            </a:endParaRPr>
+          </a:p>
+          <a:p>
+            <a:pPr>
               <a:lnSpc>
                 <a:spcPct val="100000"/>
               </a:lnSpc>
               <a:spcAft>
                 <a:spcPts val="1148"/>
               </a:spcAft>
-              <a:buClr>
-                <a:srgbClr val="000000"/>
-              </a:buClr>
-              <a:buSzPct val="45000"/>
-              <a:buFont typeface="Wingdings" charset="2"/>
-              <a:buChar char=""/>
             </a:pPr>
             <a:r>
-              <a:rPr b="0" lang="en-US" sz="2600" spc="-1" strike="noStrike">
-                <a:latin typeface="Arial"/>
-              </a:rPr>
-              <a:t>Translation with the Transformer architecture</a:t>
-            </a:r>
-            <a:endParaRPr b="0" lang="en-US" sz="2600" spc="-1" strike="noStrike">
-              <a:latin typeface="Arial"/>
-            </a:endParaRPr>
-          </a:p>
-          <a:p>
-            <a:pPr marL="432000" indent="-323640">
+              <a:rPr b="1" lang="en-US" sz="1200" spc="-1" strike="noStrike">
+                <a:solidFill>
+                  <a:srgbClr val="0000ff"/>
+                </a:solidFill>
+                <a:latin typeface="Arial"/>
+              </a:rPr>
+              <a:t>3. </a:t>
+            </a:r>
+            <a:r>
+              <a:rPr b="1" lang="en-US" sz="1200" spc="-1" strike="noStrike" u="sng">
+                <a:solidFill>
+                  <a:srgbClr val="0000ff"/>
+                </a:solidFill>
+                <a:uFillTx/>
+                <a:latin typeface="Arial"/>
+                <a:hlinkClick r:id="rId2"/>
+              </a:rPr>
+              <a:t>Create an environment</a:t>
+            </a:r>
+            <a:r>
+              <a:rPr b="1" lang="en-US" sz="1200" spc="-1" strike="noStrike">
+                <a:solidFill>
+                  <a:srgbClr val="0000ff"/>
+                </a:solidFill>
+                <a:latin typeface="Arial"/>
+              </a:rPr>
+              <a:t> for fastai (See </a:t>
+            </a:r>
+            <a:r>
+              <a:rPr b="1" lang="en-US" sz="1200" spc="-1" strike="noStrike" u="sng">
+                <a:solidFill>
+                  <a:srgbClr val="0000ff"/>
+                </a:solidFill>
+                <a:uFillTx/>
+                <a:latin typeface="Arial"/>
+                <a:hlinkClick r:id="rId3"/>
+              </a:rPr>
+              <a:t>https://uoa-eresearch.github.io/eresearch-cookbook/recipe/2014/11/20/conda/</a:t>
+            </a:r>
+            <a:r>
+              <a:rPr b="1" lang="en-US" sz="1200" spc="-1" strike="noStrike">
+                <a:solidFill>
+                  <a:srgbClr val="0000ff"/>
+                </a:solidFill>
+                <a:latin typeface="Arial"/>
+              </a:rPr>
+              <a:t>),</a:t>
+            </a:r>
+            <a:endParaRPr b="0" lang="en-US" sz="1200" spc="-1" strike="noStrike">
+              <a:latin typeface="Arial"/>
+            </a:endParaRPr>
+          </a:p>
+          <a:p>
+            <a:pPr>
               <a:lnSpc>
                 <a:spcPct val="100000"/>
               </a:lnSpc>
               <a:spcAft>
                 <a:spcPts val="1148"/>
               </a:spcAft>
-              <a:buClr>
-                <a:srgbClr val="000000"/>
-              </a:buClr>
-              <a:buSzPct val="45000"/>
-              <a:buFont typeface="Wingdings" charset="2"/>
-              <a:buChar char=""/>
             </a:pPr>
             <a:r>
-              <a:rPr b="0" lang="en-US" sz="2600" spc="-1" strike="noStrike">
-                <a:latin typeface="Arial"/>
-              </a:rPr>
-              <a:t>Bias &amp; ethics in NLP</a:t>
-            </a:r>
-            <a:endParaRPr b="0" lang="en-US" sz="2600" spc="-1" strike="noStrike">
-              <a:latin typeface="Arial"/>
-            </a:endParaRPr>
-          </a:p>
-          <a:p>
-            <a:pPr marL="432000" indent="-323640">
+              <a:rPr b="1" lang="en-US" sz="1200" spc="-1" strike="noStrike">
+                <a:solidFill>
+                  <a:srgbClr val="0000ff"/>
+                </a:solidFill>
+                <a:latin typeface="Arial"/>
+              </a:rPr>
+              <a:t>    </a:t>
+            </a:r>
+            <a:r>
+              <a:rPr b="1" lang="en-US" sz="1200" spc="-1" strike="noStrike">
+                <a:solidFill>
+                  <a:srgbClr val="0000ff"/>
+                </a:solidFill>
+                <a:latin typeface="Arial"/>
+              </a:rPr>
+              <a:t>then activate that environment:</a:t>
+            </a:r>
+            <a:endParaRPr b="0" lang="en-US" sz="1200" spc="-1" strike="noStrike">
+              <a:latin typeface="Arial"/>
+            </a:endParaRPr>
+          </a:p>
+          <a:p>
+            <a:pPr>
               <a:lnSpc>
                 <a:spcPct val="100000"/>
               </a:lnSpc>
               <a:spcAft>
                 <a:spcPts val="1148"/>
               </a:spcAft>
-              <a:buClr>
-                <a:srgbClr val="000000"/>
-              </a:buClr>
-              <a:buSzPct val="45000"/>
-              <a:buFont typeface="Wingdings" charset="2"/>
-              <a:buChar char=""/>
             </a:pPr>
             <a:r>
-              <a:rPr b="0" lang="en-US" sz="2600" spc="-1" strike="noStrike">
-                <a:latin typeface="Arial"/>
-              </a:rPr>
-              <a:t>See </a:t>
-            </a:r>
-            <a:r>
-              <a:rPr b="0" lang="en-US" sz="2600" spc="-1" strike="noStrike" u="sng">
+              <a:rPr b="1" lang="en-US" sz="1200" spc="-1" strike="noStrike">
+                <a:solidFill>
+                  <a:srgbClr val="0000ff"/>
+                </a:solidFill>
+                <a:latin typeface="Lucida Console"/>
+              </a:rPr>
+              <a:t>        </a:t>
+            </a:r>
+            <a:r>
+              <a:rPr b="1" lang="en-US" sz="1200" spc="-1" strike="noStrike">
+                <a:solidFill>
+                  <a:srgbClr val="0000ff"/>
+                </a:solidFill>
+                <a:latin typeface="Lucida Console"/>
+              </a:rPr>
+              <a:t>conda create --name fastai</a:t>
+            </a:r>
+            <a:endParaRPr b="0" lang="en-US" sz="1200" spc="-1" strike="noStrike">
+              <a:latin typeface="Arial"/>
+            </a:endParaRPr>
+          </a:p>
+          <a:p>
+            <a:pPr>
+              <a:lnSpc>
+                <a:spcPct val="100000"/>
+              </a:lnSpc>
+              <a:spcAft>
+                <a:spcPts val="1148"/>
+              </a:spcAft>
+            </a:pPr>
+            <a:r>
+              <a:rPr b="1" lang="en-US" sz="1200" spc="-1" strike="noStrike">
+                <a:solidFill>
+                  <a:srgbClr val="0000ff"/>
+                </a:solidFill>
+                <a:latin typeface="Arial"/>
+              </a:rPr>
+              <a:t>                 </a:t>
+            </a:r>
+            <a:r>
+              <a:rPr b="1" lang="en-US" sz="1200" spc="-1" strike="noStrike">
+                <a:solidFill>
+                  <a:srgbClr val="0000ff"/>
+                </a:solidFill>
+                <a:latin typeface="Lucida Console"/>
+              </a:rPr>
+              <a:t>activate environment</a:t>
+            </a:r>
+            <a:endParaRPr b="0" lang="en-US" sz="1200" spc="-1" strike="noStrike">
+              <a:latin typeface="Arial"/>
+            </a:endParaRPr>
+          </a:p>
+          <a:p>
+            <a:pPr>
+              <a:lnSpc>
+                <a:spcPct val="100000"/>
+              </a:lnSpc>
+              <a:spcAft>
+                <a:spcPts val="1148"/>
+              </a:spcAft>
+            </a:pPr>
+            <a:r>
+              <a:rPr b="1" lang="en-US" sz="1200" spc="-1" strike="noStrike">
+                <a:solidFill>
+                  <a:srgbClr val="0000ff"/>
+                </a:solidFill>
+                <a:latin typeface="Arial"/>
+              </a:rPr>
+              <a:t>4. Create a fastai directory and Install the fastai library:</a:t>
+            </a:r>
+            <a:endParaRPr b="0" lang="en-US" sz="1200" spc="-1" strike="noStrike">
+              <a:latin typeface="Arial"/>
+            </a:endParaRPr>
+          </a:p>
+          <a:p>
+            <a:pPr>
+              <a:lnSpc>
+                <a:spcPct val="100000"/>
+              </a:lnSpc>
+              <a:spcAft>
+                <a:spcPts val="1148"/>
+              </a:spcAft>
+            </a:pPr>
+            <a:r>
+              <a:rPr b="1" lang="en-US" sz="1200" spc="-1" strike="noStrike">
+                <a:solidFill>
+                  <a:srgbClr val="0000ff"/>
+                </a:solidFill>
+                <a:latin typeface="Arial"/>
+              </a:rPr>
+              <a:t>                 </a:t>
+            </a:r>
+            <a:r>
+              <a:rPr b="1" lang="en-US" sz="1200" spc="-1" strike="noStrike">
+                <a:solidFill>
+                  <a:srgbClr val="0000ff"/>
+                </a:solidFill>
+                <a:latin typeface="Lucida Console"/>
+              </a:rPr>
+              <a:t>mkdir fastai</a:t>
+            </a:r>
+            <a:endParaRPr b="0" lang="en-US" sz="1200" spc="-1" strike="noStrike">
+              <a:latin typeface="Arial"/>
+            </a:endParaRPr>
+          </a:p>
+          <a:p>
+            <a:pPr>
+              <a:lnSpc>
+                <a:spcPct val="100000"/>
+              </a:lnSpc>
+              <a:spcAft>
+                <a:spcPts val="1148"/>
+              </a:spcAft>
+            </a:pPr>
+            <a:r>
+              <a:rPr b="1" lang="en-US" sz="1200" spc="-1" strike="noStrike">
+                <a:solidFill>
+                  <a:srgbClr val="0000ff"/>
+                </a:solidFill>
+                <a:latin typeface="Lucida Console"/>
+              </a:rPr>
+              <a:t>        </a:t>
+            </a:r>
+            <a:r>
+              <a:rPr b="1" lang="en-US" sz="1200" spc="-1" strike="noStrike">
+                <a:solidFill>
+                  <a:srgbClr val="0000ff"/>
+                </a:solidFill>
+                <a:latin typeface="Lucida Console"/>
+              </a:rPr>
+              <a:t>conda install -c pytorch -c fastai fastai</a:t>
+            </a:r>
+            <a:endParaRPr b="0" lang="en-US" sz="1200" spc="-1" strike="noStrike">
+              <a:latin typeface="Arial"/>
+            </a:endParaRPr>
+          </a:p>
+          <a:p>
+            <a:pPr>
+              <a:lnSpc>
+                <a:spcPct val="100000"/>
+              </a:lnSpc>
+              <a:spcAft>
+                <a:spcPts val="1148"/>
+              </a:spcAft>
+            </a:pPr>
+            <a:r>
+              <a:rPr b="1" lang="en-US" sz="1200" spc="-1" strike="noStrike">
+                <a:solidFill>
+                  <a:srgbClr val="0000ff"/>
+                </a:solidFill>
+                <a:latin typeface="Arial"/>
+              </a:rPr>
+              <a:t>5. Make a local copy of the fastai </a:t>
+            </a:r>
+            <a:r>
+              <a:rPr b="1" lang="en-US" sz="1200" spc="-1" strike="noStrike">
+                <a:solidFill>
+                  <a:srgbClr val="0000ff"/>
+                </a:solidFill>
+                <a:latin typeface="Lucida Console"/>
+              </a:rPr>
+              <a:t>course-nlp</a:t>
+            </a:r>
+            <a:r>
+              <a:rPr b="1" lang="en-US" sz="1200" spc="-1" strike="noStrike">
+                <a:solidFill>
+                  <a:srgbClr val="0000ff"/>
+                </a:solidFill>
+                <a:latin typeface="Arial"/>
+              </a:rPr>
+              <a:t> repository:</a:t>
+            </a:r>
+            <a:endParaRPr b="0" lang="en-US" sz="1200" spc="-1" strike="noStrike">
+              <a:latin typeface="Arial"/>
+            </a:endParaRPr>
+          </a:p>
+          <a:p>
+            <a:pPr>
+              <a:lnSpc>
+                <a:spcPct val="100000"/>
+              </a:lnSpc>
+              <a:spcAft>
+                <a:spcPts val="1148"/>
+              </a:spcAft>
+            </a:pPr>
+            <a:r>
+              <a:rPr b="1" lang="en-US" sz="1200" spc="-1" strike="noStrike">
+                <a:solidFill>
+                  <a:srgbClr val="0000ff"/>
+                </a:solidFill>
+                <a:latin typeface="Arial"/>
+              </a:rPr>
+              <a:t>                 </a:t>
+            </a:r>
+            <a:r>
+              <a:rPr b="1" lang="en-US" sz="1200" spc="-1" strike="noStrike">
+                <a:solidFill>
+                  <a:srgbClr val="0000ff"/>
+                </a:solidFill>
+                <a:latin typeface="Lucida Console"/>
+              </a:rPr>
+              <a:t>cd fastai</a:t>
+            </a:r>
+            <a:endParaRPr b="0" lang="en-US" sz="1200" spc="-1" strike="noStrike">
+              <a:latin typeface="Arial"/>
+            </a:endParaRPr>
+          </a:p>
+          <a:p>
+            <a:pPr>
+              <a:lnSpc>
+                <a:spcPct val="100000"/>
+              </a:lnSpc>
+              <a:spcAft>
+                <a:spcPts val="1148"/>
+              </a:spcAft>
+            </a:pPr>
+            <a:r>
+              <a:rPr b="1" lang="en-US" sz="1200" spc="-1" strike="noStrike">
+                <a:solidFill>
+                  <a:srgbClr val="0000ff"/>
+                </a:solidFill>
+                <a:latin typeface="Lucida Sans Unicode"/>
+              </a:rPr>
+              <a:t>               </a:t>
+            </a:r>
+            <a:r>
+              <a:rPr b="1" lang="en-US" sz="1200" spc="-1" strike="noStrike">
+                <a:solidFill>
+                  <a:srgbClr val="0000ff"/>
+                </a:solidFill>
+                <a:latin typeface="Lucida Console"/>
+              </a:rPr>
+              <a:t>git clone </a:t>
+            </a:r>
+            <a:r>
+              <a:rPr b="1" lang="en-US" sz="1200" spc="-1" strike="noStrike" u="sng">
                 <a:solidFill>
                   <a:srgbClr val="0000ff"/>
                 </a:solidFill>
                 <a:uFillTx/>
-                <a:latin typeface="Arial"/>
-                <a:hlinkClick r:id="rId1"/>
-              </a:rPr>
-              <a:t>notebook0</a:t>
-            </a:r>
-            <a:r>
-              <a:rPr b="0" lang="en-US" sz="2600" spc="-1" strike="noStrike">
+                <a:latin typeface="Lucida Console"/>
+                <a:hlinkClick r:id="rId4"/>
+              </a:rPr>
+              <a:t>https://github.com/fastai/course-nlp.git</a:t>
+            </a:r>
+            <a:endParaRPr b="0" lang="en-US" sz="1200" spc="-1" strike="noStrike">
+              <a:latin typeface="Arial"/>
+            </a:endParaRPr>
+          </a:p>
+          <a:p>
+            <a:pPr>
+              <a:lnSpc>
+                <a:spcPct val="100000"/>
+              </a:lnSpc>
+              <a:spcAft>
+                <a:spcPts val="1148"/>
+              </a:spcAft>
+            </a:pPr>
+            <a:r>
+              <a:rPr b="0" lang="en-US" sz="1200" spc="-1" strike="noStrike">
                 <a:solidFill>
                   <a:srgbClr val="0000ff"/>
                 </a:solidFill>
-                <a:latin typeface="Arial"/>
-              </a:rPr>
-              <a:t>  for a complete list, and references</a:t>
-            </a:r>
-            <a:endParaRPr b="0" lang="en-US" sz="2600" spc="-1" strike="noStrike">
+                <a:latin typeface="Lucida Sans Unicode"/>
+              </a:rPr>
+              <a:t>           </a:t>
+            </a:r>
+            <a:endParaRPr b="0" lang="en-US" sz="1200" spc="-1" strike="noStrike">
+              <a:latin typeface="Arial"/>
+            </a:endParaRPr>
+          </a:p>
+          <a:p>
+            <a:pPr>
+              <a:lnSpc>
+                <a:spcPct val="100000"/>
+              </a:lnSpc>
+              <a:spcAft>
+                <a:spcPts val="1148"/>
+              </a:spcAft>
+            </a:pPr>
+            <a:r>
+              <a:rPr b="0" lang="en-US" sz="1200" spc="-1" strike="noStrike">
+                <a:solidFill>
+                  <a:srgbClr val="0000ff"/>
+                </a:solidFill>
+                <a:latin typeface="Lucida Sans Unicode"/>
+              </a:rPr>
+              <a:t>                </a:t>
+            </a:r>
+            <a:endParaRPr b="0" lang="en-US" sz="1200" spc="-1" strike="noStrike">
               <a:latin typeface="Arial"/>
             </a:endParaRPr>
           </a:p>
@@ -4140,14 +4679,14 @@
       </p:grpSpPr>
       <p:sp>
         <p:nvSpPr>
-          <p:cNvPr id="84" name="TextShape 1"/>
-          <p:cNvSpPr txBox="1"/>
+          <p:cNvPr id="84" name="CustomShape 1"/>
+          <p:cNvSpPr/>
           <p:nvPr/>
         </p:nvSpPr>
         <p:spPr>
           <a:xfrm>
-            <a:off x="504000" y="59040"/>
-            <a:ext cx="7019640" cy="1250280"/>
+            <a:off x="504000" y="411480"/>
+            <a:ext cx="7019640" cy="544320"/>
           </a:xfrm>
           <a:prstGeom prst="rect">
             <a:avLst/>
@@ -4157,28 +4696,41 @@
             <a:noFill/>
           </a:ln>
         </p:spPr>
+        <p:style>
+          <a:lnRef idx="0"/>
+          <a:fillRef idx="0"/>
+          <a:effectRef idx="0"/>
+          <a:fontRef idx="minor"/>
+        </p:style>
         <p:txBody>
           <a:bodyPr lIns="0" rIns="0" tIns="0" bIns="0" anchor="ctr">
             <a:spAutoFit/>
           </a:bodyPr>
           <a:p>
-            <a:pPr algn="ctr"/>
-            <a:r>
-              <a:rPr b="0" lang="en-US" sz="4400" spc="-1" strike="noStrike">
-                <a:latin typeface="Arial"/>
-              </a:rPr>
-              <a:t>Non-negative Matrix Factorization</a:t>
-            </a:r>
-            <a:endParaRPr b="0" lang="en-US" sz="4400" spc="-1" strike="noStrike">
-              <a:latin typeface="Arial"/>
-            </a:endParaRPr>
-          </a:p>
-        </p:txBody>
-      </p:sp>
-      <p:sp>
-        <p:nvSpPr>
-          <p:cNvPr id="85" name="TextShape 2"/>
-          <p:cNvSpPr txBox="1"/>
+            <a:pPr>
+              <a:lnSpc>
+                <a:spcPct val="100000"/>
+              </a:lnSpc>
+            </a:pPr>
+            <a:r>
+              <a:rPr b="0" lang="en-US" sz="3570" spc="-1" strike="noStrike">
+                <a:solidFill>
+                  <a:srgbClr val="ffffff"/>
+                </a:solidFill>
+                <a:latin typeface="Arial"/>
+              </a:rPr>
+              <a:t>Running a course notebook</a:t>
+            </a:r>
+            <a:endParaRPr b="0" lang="en-US" sz="3570" spc="-1" strike="noStrike">
+              <a:latin typeface="Arial"/>
+            </a:endParaRPr>
+          </a:p>
+        </p:txBody>
+      </p:sp>
+      <p:sp>
+        <p:nvSpPr>
+          <p:cNvPr id="85" name="CustomShape 2"/>
+          <p:cNvSpPr/>
           <p:nvPr/>
         </p:nvSpPr>
         <p:spPr>
@@ -4194,29 +4746,219 @@
             <a:noFill/>
           </a:ln>
         </p:spPr>
+        <p:style>
+          <a:lnRef idx="0"/>
+          <a:fillRef idx="0"/>
+          <a:effectRef idx="0"/>
+          <a:fontRef idx="minor"/>
+        </p:style>
         <p:txBody>
           <a:bodyPr lIns="0" rIns="0" tIns="0" bIns="0">
-            <a:normAutofit/>
-          </a:bodyPr>
-          <a:p>
-            <a:pPr marL="432000" indent="-324000">
-              <a:spcBef>
-                <a:spcPts val="1417"/>
-              </a:spcBef>
-              <a:buClr>
-                <a:srgbClr val="000000"/>
-              </a:buClr>
-              <a:buSzPct val="45000"/>
-              <a:buFont typeface="Wingdings" charset="2"/>
-              <a:buChar char=""/>
+            <a:normAutofit fontScale="51000"/>
+          </a:bodyPr>
+          <a:p>
+            <a:pPr>
+              <a:lnSpc>
+                <a:spcPct val="100000"/>
+              </a:lnSpc>
             </a:pPr>
             <a:r>
-              <a:rPr b="0" lang="en-US" sz="3200" spc="-1" strike="noStrike">
-                <a:latin typeface="Arial"/>
-              </a:rPr>
-              <a:t>NMF Discussion http://www.quuxlabs.com/blog/2010/09/matrix-factorization-a-simple-tutorial-and-implementation-in-python/</a:t>
-            </a:r>
-            <a:endParaRPr b="0" lang="en-US" sz="3200" spc="-1" strike="noStrike">
+              <a:rPr b="1" lang="en-US" sz="2600" spc="-1" strike="noStrike">
+                <a:latin typeface="Arial"/>
+              </a:rPr>
+              <a:t>1. Open an anaconda shell, with the Anaconda Prompt</a:t>
+            </a:r>
+            <a:endParaRPr b="0" lang="en-US" sz="2600" spc="-1" strike="noStrike">
+              <a:latin typeface="Arial"/>
+            </a:endParaRPr>
+          </a:p>
+          <a:p>
+            <a:pPr>
+              <a:lnSpc>
+                <a:spcPct val="100000"/>
+              </a:lnSpc>
+            </a:pPr>
+            <a:r>
+              <a:rPr b="1" lang="en-US" sz="2600" spc="-1" strike="noStrike">
+                <a:latin typeface="Arial"/>
+              </a:rPr>
+              <a:t>2. Activate the fastai environment</a:t>
+            </a:r>
+            <a:endParaRPr b="0" lang="en-US" sz="2600" spc="-1" strike="noStrike">
+              <a:latin typeface="Arial"/>
+            </a:endParaRPr>
+          </a:p>
+          <a:p>
+            <a:pPr>
+              <a:lnSpc>
+                <a:spcPct val="100000"/>
+              </a:lnSpc>
+            </a:pPr>
+            <a:r>
+              <a:rPr b="1" lang="en-US" sz="2600" spc="-1" strike="noStrike">
+                <a:latin typeface="Arial"/>
+              </a:rPr>
+              <a:t>    </a:t>
+            </a:r>
+            <a:r>
+              <a:rPr b="1" lang="en-US" sz="2600" spc="-1" strike="noStrike">
+                <a:latin typeface="Lucida Console"/>
+              </a:rPr>
+              <a:t>activate fastai</a:t>
+            </a:r>
+            <a:endParaRPr b="0" lang="en-US" sz="2600" spc="-1" strike="noStrike">
+              <a:latin typeface="Arial"/>
+            </a:endParaRPr>
+          </a:p>
+          <a:p>
+            <a:pPr>
+              <a:lnSpc>
+                <a:spcPct val="100000"/>
+              </a:lnSpc>
+            </a:pPr>
+            <a:r>
+              <a:rPr b="1" lang="en-US" sz="2600" spc="-1" strike="noStrike">
+                <a:latin typeface="Arial"/>
+              </a:rPr>
+              <a:t>2. Go to your local copy of the course repository </a:t>
+            </a:r>
+            <a:endParaRPr b="0" lang="en-US" sz="2600" spc="-1" strike="noStrike">
+              <a:latin typeface="Arial"/>
+            </a:endParaRPr>
+          </a:p>
+          <a:p>
+            <a:pPr>
+              <a:lnSpc>
+                <a:spcPct val="100000"/>
+              </a:lnSpc>
+            </a:pPr>
+            <a:r>
+              <a:rPr b="1" lang="en-US" sz="2600" spc="-1" strike="noStrike">
+                <a:latin typeface="Lucida Console"/>
+              </a:rPr>
+              <a:t>  </a:t>
+            </a:r>
+            <a:r>
+              <a:rPr b="1" lang="en-US" sz="2600" spc="-1" strike="noStrike">
+                <a:latin typeface="Lucida Console"/>
+              </a:rPr>
+              <a:t>cd fastai/course-nlp/</a:t>
+            </a:r>
+            <a:endParaRPr b="0" lang="en-US" sz="2600" spc="-1" strike="noStrike">
+              <a:latin typeface="Arial"/>
+            </a:endParaRPr>
+          </a:p>
+          <a:p>
+            <a:pPr>
+              <a:lnSpc>
+                <a:spcPct val="100000"/>
+              </a:lnSpc>
+            </a:pPr>
+            <a:r>
+              <a:rPr b="1" lang="en-US" sz="2600" spc="-1" strike="noStrike">
+                <a:latin typeface="Arial"/>
+              </a:rPr>
+              <a:t>3. Run the command</a:t>
+            </a:r>
+            <a:endParaRPr b="0" lang="en-US" sz="2600" spc="-1" strike="noStrike">
+              <a:latin typeface="Arial"/>
+            </a:endParaRPr>
+          </a:p>
+          <a:p>
+            <a:pPr>
+              <a:lnSpc>
+                <a:spcPct val="100000"/>
+              </a:lnSpc>
+            </a:pPr>
+            <a:r>
+              <a:rPr b="1" lang="en-US" sz="2600" spc="-1" strike="noStrike">
+                <a:latin typeface="Lucida Console"/>
+              </a:rPr>
+              <a:t>  </a:t>
+            </a:r>
+            <a:r>
+              <a:rPr b="1" lang="en-US" sz="2600" spc="-1" strike="noStrike">
+                <a:latin typeface="Lucida Console"/>
+              </a:rPr>
+              <a:t>jupyter notebook</a:t>
+            </a:r>
+            <a:endParaRPr b="0" lang="en-US" sz="2600" spc="-1" strike="noStrike">
+              <a:latin typeface="Arial"/>
+            </a:endParaRPr>
+          </a:p>
+          <a:p>
+            <a:pPr>
+              <a:lnSpc>
+                <a:spcPct val="100000"/>
+              </a:lnSpc>
+            </a:pPr>
+            <a:r>
+              <a:rPr b="1" lang="en-US" sz="2600" spc="-1" strike="noStrike">
+                <a:latin typeface="Arial"/>
+              </a:rPr>
+              <a:t>    </a:t>
+            </a:r>
+            <a:r>
+              <a:rPr b="1" lang="en-US" sz="2600" spc="-1" strike="noStrike">
+                <a:latin typeface="Arial"/>
+              </a:rPr>
+              <a:t>A new browser tab will open, with links to the course notebooks in the repository </a:t>
+            </a:r>
+            <a:endParaRPr b="0" lang="en-US" sz="2600" spc="-1" strike="noStrike">
+              <a:latin typeface="Arial"/>
+            </a:endParaRPr>
+          </a:p>
+          <a:p>
+            <a:pPr>
+              <a:lnSpc>
+                <a:spcPct val="100000"/>
+              </a:lnSpc>
+            </a:pPr>
+            <a:r>
+              <a:rPr b="1" lang="en-US" sz="2600" spc="-1" strike="noStrike">
+                <a:latin typeface="Arial"/>
+              </a:rPr>
+              <a:t>4. Clicking on a selected notebook link opens that notebook in a separate browser tab</a:t>
+            </a:r>
+            <a:endParaRPr b="0" lang="en-US" sz="2600" spc="-1" strike="noStrike">
+              <a:latin typeface="Arial"/>
+            </a:endParaRPr>
+          </a:p>
+          <a:p>
+            <a:pPr>
+              <a:lnSpc>
+                <a:spcPct val="100000"/>
+              </a:lnSpc>
+            </a:pPr>
+            <a:r>
+              <a:rPr b="1" lang="en-US" sz="2600" spc="-1" strike="noStrike">
+                <a:latin typeface="Arial"/>
+              </a:rPr>
+              <a:t>5. We’ll cover the notebook </a:t>
+            </a:r>
+            <a:r>
+              <a:rPr b="1" lang="en-US" sz="2600" spc="-1" strike="noStrike">
+                <a:latin typeface="Lucida Console"/>
+              </a:rPr>
+              <a:t>2-svd-nmf-topic-modeling</a:t>
+            </a:r>
+            <a:r>
+              <a:rPr b="1" lang="en-US" sz="2600" spc="-1" strike="noStrike">
+                <a:latin typeface="Arial"/>
+              </a:rPr>
+              <a:t> next week. Click on it and verify that you can run the code blocks within it.</a:t>
+            </a:r>
+            <a:endParaRPr b="0" lang="en-US" sz="2600" spc="-1" strike="noStrike">
+              <a:latin typeface="Arial"/>
+            </a:endParaRPr>
+          </a:p>
+          <a:p>
+            <a:pPr>
+              <a:lnSpc>
+                <a:spcPct val="100000"/>
+              </a:lnSpc>
+            </a:pPr>
+            <a:endParaRPr b="0" lang="en-US" sz="2600" spc="-1" strike="noStrike">
               <a:latin typeface="Arial"/>
             </a:endParaRPr>
           </a:p>
@@ -4254,14 +4996,14 @@
       </p:grpSpPr>
       <p:sp>
         <p:nvSpPr>
-          <p:cNvPr id="86" name="TextShape 1"/>
-          <p:cNvSpPr txBox="1"/>
+          <p:cNvPr id="86" name="CustomShape 1"/>
+          <p:cNvSpPr/>
           <p:nvPr/>
         </p:nvSpPr>
         <p:spPr>
           <a:xfrm>
-            <a:off x="504000" y="210600"/>
-            <a:ext cx="7019640" cy="946800"/>
+            <a:off x="504000" y="411480"/>
+            <a:ext cx="7019640" cy="544320"/>
           </a:xfrm>
           <a:prstGeom prst="rect">
             <a:avLst/>
@@ -4271,28 +5013,41 @@
             <a:noFill/>
           </a:ln>
         </p:spPr>
+        <p:style>
+          <a:lnRef idx="0"/>
+          <a:fillRef idx="0"/>
+          <a:effectRef idx="0"/>
+          <a:fontRef idx="minor"/>
+        </p:style>
         <p:txBody>
           <a:bodyPr lIns="0" rIns="0" tIns="0" bIns="0" anchor="ctr">
             <a:spAutoFit/>
           </a:bodyPr>
           <a:p>
-            <a:pPr algn="ctr"/>
-            <a:r>
-              <a:rPr b="0" lang="en-US" sz="4400" spc="-1" strike="noStrike">
-                <a:latin typeface="Arial"/>
-              </a:rPr>
-              <a:t>SVD</a:t>
-            </a:r>
-            <a:endParaRPr b="0" lang="en-US" sz="4400" spc="-1" strike="noStrike">
-              <a:latin typeface="Arial"/>
-            </a:endParaRPr>
-          </a:p>
-        </p:txBody>
-      </p:sp>
-      <p:sp>
-        <p:nvSpPr>
-          <p:cNvPr id="87" name="TextShape 2"/>
-          <p:cNvSpPr txBox="1"/>
+            <a:pPr>
+              <a:lnSpc>
+                <a:spcPct val="100000"/>
+              </a:lnSpc>
+            </a:pPr>
+            <a:r>
+              <a:rPr b="0" lang="en-US" sz="3570" spc="-1" strike="noStrike">
+                <a:solidFill>
+                  <a:srgbClr val="ffffff"/>
+                </a:solidFill>
+                <a:latin typeface="Arial"/>
+              </a:rPr>
+              <a:t>Topics covered</a:t>
+            </a:r>
+            <a:endParaRPr b="0" lang="en-US" sz="3570" spc="-1" strike="noStrike">
+              <a:latin typeface="Arial"/>
+            </a:endParaRPr>
+          </a:p>
+        </p:txBody>
+      </p:sp>
+      <p:sp>
+        <p:nvSpPr>
+          <p:cNvPr id="87" name="CustomShape 2"/>
+          <p:cNvSpPr/>
           <p:nvPr/>
         </p:nvSpPr>
         <p:spPr>
@@ -4308,15 +5063,24 @@
             <a:noFill/>
           </a:ln>
         </p:spPr>
+        <p:style>
+          <a:lnRef idx="0"/>
+          <a:fillRef idx="0"/>
+          <a:effectRef idx="0"/>
+          <a:fontRef idx="minor"/>
+        </p:style>
         <p:txBody>
           <a:bodyPr lIns="0" rIns="0" tIns="0" bIns="0">
-            <a:normAutofit/>
-          </a:bodyPr>
-          <a:p>
-            <a:pPr marL="432000" indent="-324000">
-              <a:spcBef>
-                <a:spcPts val="1417"/>
-              </a:spcBef>
+            <a:normAutofit fontScale="51000"/>
+          </a:bodyPr>
+          <a:p>
+            <a:pPr marL="432000" indent="-323640">
+              <a:lnSpc>
+                <a:spcPct val="100000"/>
+              </a:lnSpc>
+              <a:spcAft>
+                <a:spcPts val="1148"/>
+              </a:spcAft>
               <a:buClr>
                 <a:srgbClr val="000000"/>
               </a:buClr>
@@ -4325,12 +5089,207 @@
               <a:buChar char=""/>
             </a:pPr>
             <a:r>
-              <a:rPr b="0" lang="en-US" sz="3200" spc="-1" strike="noStrike">
-                <a:latin typeface="Arial"/>
-              </a:rPr>
-              <a:t>https://research.fb.com/fast-randomized-svd/</a:t>
-            </a:r>
-            <a:endParaRPr b="0" lang="en-US" sz="3200" spc="-1" strike="noStrike">
+              <a:rPr b="0" lang="en-US" sz="2600" spc="-1" strike="noStrike">
+                <a:latin typeface="Arial"/>
+              </a:rPr>
+              <a:t>Topic Modeling with NMF (non-negative matrix factorization)and SVD (Singular Value Decomposition)</a:t>
+            </a:r>
+            <a:endParaRPr b="0" lang="en-US" sz="2600" spc="-1" strike="noStrike">
+              <a:latin typeface="Arial"/>
+            </a:endParaRPr>
+          </a:p>
+          <a:p>
+            <a:pPr marL="432000" indent="-323640">
+              <a:lnSpc>
+                <a:spcPct val="100000"/>
+              </a:lnSpc>
+              <a:spcAft>
+                <a:spcPts val="1148"/>
+              </a:spcAft>
+              <a:buClr>
+                <a:srgbClr val="000000"/>
+              </a:buClr>
+              <a:buSzPct val="45000"/>
+              <a:buFont typeface="Wingdings" charset="2"/>
+              <a:buChar char=""/>
+            </a:pPr>
+            <a:r>
+              <a:rPr b="0" lang="en-US" sz="2600" spc="-1" strike="noStrike">
+                <a:latin typeface="Arial"/>
+              </a:rPr>
+              <a:t>Sentiment classification with Naive Bayes, Logistic regression, and ngrams</a:t>
+            </a:r>
+            <a:endParaRPr b="0" lang="en-US" sz="2600" spc="-1" strike="noStrike">
+              <a:latin typeface="Arial"/>
+            </a:endParaRPr>
+          </a:p>
+          <a:p>
+            <a:pPr marL="432000" indent="-323640">
+              <a:lnSpc>
+                <a:spcPct val="100000"/>
+              </a:lnSpc>
+              <a:spcAft>
+                <a:spcPts val="1148"/>
+              </a:spcAft>
+              <a:buClr>
+                <a:srgbClr val="000000"/>
+              </a:buClr>
+              <a:buSzPct val="45000"/>
+              <a:buFont typeface="Wingdings" charset="2"/>
+              <a:buChar char=""/>
+            </a:pPr>
+            <a:r>
+              <a:rPr b="0" lang="en-US" sz="2600" spc="-1" strike="noStrike">
+                <a:latin typeface="Arial"/>
+              </a:rPr>
+              <a:t>Regex and tokenization</a:t>
+            </a:r>
+            <a:endParaRPr b="0" lang="en-US" sz="2600" spc="-1" strike="noStrike">
+              <a:latin typeface="Arial"/>
+            </a:endParaRPr>
+          </a:p>
+          <a:p>
+            <a:pPr marL="432000" indent="-323640">
+              <a:lnSpc>
+                <a:spcPct val="100000"/>
+              </a:lnSpc>
+              <a:spcAft>
+                <a:spcPts val="1148"/>
+              </a:spcAft>
+              <a:buClr>
+                <a:srgbClr val="000000"/>
+              </a:buClr>
+              <a:buSzPct val="45000"/>
+              <a:buFont typeface="Wingdings" charset="2"/>
+              <a:buChar char=""/>
+            </a:pPr>
+            <a:r>
+              <a:rPr b="0" lang="en-US" sz="2600" spc="-1" strike="noStrike">
+                <a:latin typeface="Arial"/>
+              </a:rPr>
+              <a:t>Language modeling &amp; sentiment classification with deep learning</a:t>
+            </a:r>
+            <a:endParaRPr b="0" lang="en-US" sz="2600" spc="-1" strike="noStrike">
+              <a:latin typeface="Arial"/>
+            </a:endParaRPr>
+          </a:p>
+          <a:p>
+            <a:pPr marL="432000" indent="-323640">
+              <a:lnSpc>
+                <a:spcPct val="100000"/>
+              </a:lnSpc>
+              <a:spcAft>
+                <a:spcPts val="1148"/>
+              </a:spcAft>
+              <a:buClr>
+                <a:srgbClr val="000000"/>
+              </a:buClr>
+              <a:buSzPct val="45000"/>
+              <a:buFont typeface="Wingdings" charset="2"/>
+              <a:buChar char=""/>
+            </a:pPr>
+            <a:r>
+              <a:rPr b="0" lang="en-US" sz="2600" spc="-1" strike="noStrike">
+                <a:latin typeface="Arial"/>
+              </a:rPr>
+              <a:t>Translation with Recurrent Neural Networks</a:t>
+            </a:r>
+            <a:endParaRPr b="0" lang="en-US" sz="2600" spc="-1" strike="noStrike">
+              <a:latin typeface="Arial"/>
+            </a:endParaRPr>
+          </a:p>
+          <a:p>
+            <a:pPr marL="432000" indent="-323640">
+              <a:lnSpc>
+                <a:spcPct val="100000"/>
+              </a:lnSpc>
+              <a:spcAft>
+                <a:spcPts val="1148"/>
+              </a:spcAft>
+              <a:buClr>
+                <a:srgbClr val="000000"/>
+              </a:buClr>
+              <a:buSzPct val="45000"/>
+              <a:buFont typeface="Wingdings" charset="2"/>
+              <a:buChar char=""/>
+            </a:pPr>
+            <a:r>
+              <a:rPr b="0" lang="en-US" sz="2600" spc="-1" strike="noStrike">
+                <a:latin typeface="Arial"/>
+              </a:rPr>
+              <a:t>Translation with the Transformer architecture</a:t>
+            </a:r>
+            <a:endParaRPr b="0" lang="en-US" sz="2600" spc="-1" strike="noStrike">
+              <a:latin typeface="Arial"/>
+            </a:endParaRPr>
+          </a:p>
+          <a:p>
+            <a:pPr marL="432000" indent="-323640">
+              <a:lnSpc>
+                <a:spcPct val="100000"/>
+              </a:lnSpc>
+              <a:spcAft>
+                <a:spcPts val="1148"/>
+              </a:spcAft>
+              <a:buClr>
+                <a:srgbClr val="000000"/>
+              </a:buClr>
+              <a:buSzPct val="45000"/>
+              <a:buFont typeface="Wingdings" charset="2"/>
+              <a:buChar char=""/>
+            </a:pPr>
+            <a:r>
+              <a:rPr b="0" lang="en-US" sz="2600" spc="-1" strike="noStrike">
+                <a:latin typeface="Arial"/>
+              </a:rPr>
+              <a:t>Bias &amp; ethics in NLP</a:t>
+            </a:r>
+            <a:endParaRPr b="0" lang="en-US" sz="2600" spc="-1" strike="noStrike">
+              <a:latin typeface="Arial"/>
+            </a:endParaRPr>
+          </a:p>
+          <a:p>
+            <a:pPr marL="432000" indent="-323640">
+              <a:lnSpc>
+                <a:spcPct val="100000"/>
+              </a:lnSpc>
+              <a:spcAft>
+                <a:spcPts val="1148"/>
+              </a:spcAft>
+              <a:buClr>
+                <a:srgbClr val="000000"/>
+              </a:buClr>
+              <a:buSzPct val="45000"/>
+              <a:buFont typeface="Wingdings" charset="2"/>
+              <a:buChar char=""/>
+            </a:pPr>
+            <a:r>
+              <a:rPr b="0" lang="en-US" sz="2600" spc="-1" strike="noStrike">
+                <a:latin typeface="Arial"/>
+              </a:rPr>
+              <a:t>See </a:t>
+            </a:r>
+            <a:r>
+              <a:rPr b="0" lang="en-US" sz="2600" spc="-1" strike="noStrike" u="sng">
+                <a:solidFill>
+                  <a:srgbClr val="0000ff"/>
+                </a:solidFill>
+                <a:uFillTx/>
+                <a:latin typeface="Arial"/>
+                <a:hlinkClick r:id="rId1"/>
+              </a:rPr>
+              <a:t>notebook0</a:t>
+            </a:r>
+            <a:r>
+              <a:rPr b="0" lang="en-US" sz="2600" spc="-1" strike="noStrike">
+                <a:solidFill>
+                  <a:srgbClr val="0000ff"/>
+                </a:solidFill>
+                <a:latin typeface="Arial"/>
+              </a:rPr>
+              <a:t>  for a complete list, and references</a:t>
+            </a:r>
+            <a:endParaRPr b="0" lang="en-US" sz="2600" spc="-1" strike="noStrike">
               <a:latin typeface="Arial"/>
             </a:endParaRPr>
           </a:p>
@@ -4368,14 +5327,14 @@
       </p:grpSpPr>
       <p:sp>
         <p:nvSpPr>
-          <p:cNvPr id="88" name="CustomShape 1"/>
-          <p:cNvSpPr/>
+          <p:cNvPr id="88" name="TextShape 1"/>
+          <p:cNvSpPr txBox="1"/>
           <p:nvPr/>
         </p:nvSpPr>
         <p:spPr>
           <a:xfrm>
-            <a:off x="504000" y="411480"/>
-            <a:ext cx="7019640" cy="544320"/>
+            <a:off x="504000" y="210600"/>
+            <a:ext cx="7019640" cy="946800"/>
           </a:xfrm>
           <a:prstGeom prst="rect">
             <a:avLst/>
@@ -4385,594 +5344,47 @@
             <a:noFill/>
           </a:ln>
         </p:spPr>
-        <p:style>
-          <a:lnRef idx="0"/>
-          <a:fillRef idx="0"/>
-          <a:effectRef idx="0"/>
-          <a:fontRef idx="minor"/>
-        </p:style>
         <p:txBody>
           <a:bodyPr lIns="0" rIns="0" tIns="0" bIns="0" anchor="ctr">
             <a:spAutoFit/>
           </a:bodyPr>
           <a:p>
-            <a:pPr>
-              <a:lnSpc>
-                <a:spcPct val="100000"/>
-              </a:lnSpc>
-            </a:pPr>
-            <a:r>
-              <a:rPr b="0" lang="en-US" sz="3570" spc="-1" strike="noStrike">
-                <a:solidFill>
-                  <a:srgbClr val="ffffff"/>
-                </a:solidFill>
-                <a:latin typeface="Arial"/>
-              </a:rPr>
-              <a:t>Set up your compute infrastructure</a:t>
-            </a:r>
-            <a:endParaRPr b="0" lang="en-US" sz="3570" spc="-1" strike="noStrike">
-              <a:latin typeface="Arial"/>
-            </a:endParaRPr>
-          </a:p>
-        </p:txBody>
-      </p:sp>
-      <p:sp>
-        <p:nvSpPr>
-          <p:cNvPr id="89" name="CustomShape 2"/>
-          <p:cNvSpPr/>
+            <a:pPr algn="ctr"/>
+            <a:r>
+              <a:rPr b="0" lang="en-US" sz="4400" spc="-1" strike="noStrike">
+                <a:latin typeface="Arial"/>
+              </a:rPr>
+              <a:t>Matrix Multiplication</a:t>
+            </a:r>
+            <a:endParaRPr b="0" lang="en-US" sz="4400" spc="-1" strike="noStrike">
+              <a:latin typeface="Arial"/>
+            </a:endParaRPr>
+          </a:p>
+        </p:txBody>
+      </p:sp>
+      <p:pic>
+        <p:nvPicPr>
+          <p:cNvPr id="89" name="" descr=""/>
+          <p:cNvPicPr/>
           <p:nvPr/>
-        </p:nvSpPr>
-        <p:spPr>
-          <a:xfrm>
-            <a:off x="504000" y="1404360"/>
-            <a:ext cx="9240120" cy="4031640"/>
-          </a:xfrm>
-          <a:prstGeom prst="rect">
-            <a:avLst/>
-          </a:prstGeom>
-          <a:noFill/>
+        </p:nvPicPr>
+        <p:blipFill>
+          <a:blip r:embed="rId1"/>
+          <a:stretch/>
+        </p:blipFill>
+        <p:spPr>
+          <a:xfrm>
+            <a:off x="2773080" y="1367640"/>
+            <a:ext cx="3719160" cy="4208400"/>
+          </a:xfrm>
+          <a:prstGeom prst="rect">
+            <a:avLst/>
+          </a:prstGeom>
           <a:ln>
             <a:noFill/>
           </a:ln>
         </p:spPr>
-        <p:style>
-          <a:lnRef idx="0"/>
-          <a:fillRef idx="0"/>
-          <a:effectRef idx="0"/>
-          <a:fontRef idx="minor"/>
-        </p:style>
-        <p:txBody>
-          <a:bodyPr lIns="0" rIns="0" tIns="0" bIns="0">
-            <a:normAutofit fontScale="63000"/>
-          </a:bodyPr>
-          <a:p>
-            <a:pPr>
-              <a:lnSpc>
-                <a:spcPct val="100000"/>
-              </a:lnSpc>
-              <a:spcAft>
-                <a:spcPts val="1148"/>
-              </a:spcAft>
-            </a:pPr>
-            <a:r>
-              <a:rPr b="0" lang="en-US" sz="1200" spc="-1" strike="noStrike">
-                <a:latin typeface="Arial"/>
-              </a:rPr>
-              <a:t>1. </a:t>
-            </a:r>
-            <a:r>
-              <a:rPr b="1" lang="en-US" sz="1200" spc="-1" strike="noStrike">
-                <a:latin typeface="Arial"/>
-              </a:rPr>
-              <a:t>Download the Anaconda Python 3.7 distribution at</a:t>
-            </a:r>
-            <a:endParaRPr b="0" lang="en-US" sz="1200" spc="-1" strike="noStrike">
-              <a:latin typeface="Arial"/>
-            </a:endParaRPr>
-          </a:p>
-          <a:p>
-            <a:pPr>
-              <a:lnSpc>
-                <a:spcPct val="100000"/>
-              </a:lnSpc>
-              <a:spcAft>
-                <a:spcPts val="1148"/>
-              </a:spcAft>
-            </a:pPr>
-            <a:r>
-              <a:rPr b="1" lang="en-US" sz="1200" spc="-1" strike="noStrike">
-                <a:latin typeface="Arial"/>
-              </a:rPr>
-              <a:t>    </a:t>
-            </a:r>
-            <a:r>
-              <a:rPr b="1" lang="en-US" sz="1200" spc="-1" strike="noStrike">
-                <a:solidFill>
-                  <a:srgbClr val="000000"/>
-                </a:solidFill>
-                <a:latin typeface="Lucida Console"/>
-              </a:rPr>
-              <a:t>https://www.anaconda.com/distribution/#download-section</a:t>
-            </a:r>
-            <a:endParaRPr b="0" lang="en-US" sz="1200" spc="-1" strike="noStrike">
-              <a:latin typeface="Arial"/>
-            </a:endParaRPr>
-          </a:p>
-          <a:p>
-            <a:pPr>
-              <a:lnSpc>
-                <a:spcPct val="100000"/>
-              </a:lnSpc>
-              <a:spcAft>
-                <a:spcPts val="1148"/>
-              </a:spcAft>
-            </a:pPr>
-            <a:r>
-              <a:rPr b="1" lang="en-US" sz="1200" spc="-1" strike="noStrike">
-                <a:solidFill>
-                  <a:srgbClr val="000000"/>
-                </a:solidFill>
-                <a:latin typeface="Arial"/>
-              </a:rPr>
-              <a:t>2. Install Anaconda by following the instructions at </a:t>
-            </a:r>
-            <a:endParaRPr b="0" lang="en-US" sz="1200" spc="-1" strike="noStrike">
-              <a:latin typeface="Arial"/>
-            </a:endParaRPr>
-          </a:p>
-          <a:p>
-            <a:pPr>
-              <a:lnSpc>
-                <a:spcPct val="100000"/>
-              </a:lnSpc>
-              <a:spcAft>
-                <a:spcPts val="1148"/>
-              </a:spcAft>
-            </a:pPr>
-            <a:r>
-              <a:rPr b="1" lang="en-US" sz="1200" spc="-1" strike="noStrike">
-                <a:solidFill>
-                  <a:srgbClr val="000000"/>
-                </a:solidFill>
-                <a:latin typeface="Lucida Console"/>
-              </a:rPr>
-              <a:t>  </a:t>
-            </a:r>
-            <a:r>
-              <a:rPr b="1" lang="en-US" sz="1200" spc="-1" strike="noStrike" u="sng">
-                <a:solidFill>
-                  <a:srgbClr val="0000ff"/>
-                </a:solidFill>
-                <a:uFillTx/>
-                <a:latin typeface="Lucida Console"/>
-                <a:hlinkClick r:id="rId1"/>
-              </a:rPr>
-              <a:t>https://docs.anaconda.com/anaconda/install/</a:t>
-            </a:r>
-            <a:endParaRPr b="0" lang="en-US" sz="1200" spc="-1" strike="noStrike">
-              <a:latin typeface="Arial"/>
-            </a:endParaRPr>
-          </a:p>
-          <a:p>
-            <a:pPr>
-              <a:lnSpc>
-                <a:spcPct val="100000"/>
-              </a:lnSpc>
-              <a:spcAft>
-                <a:spcPts val="1148"/>
-              </a:spcAft>
-            </a:pPr>
-            <a:r>
-              <a:rPr b="1" lang="en-US" sz="1200" spc="-1" strike="noStrike">
-                <a:solidFill>
-                  <a:srgbClr val="0000ff"/>
-                </a:solidFill>
-                <a:latin typeface="Lucida Sans Unicode"/>
-              </a:rPr>
-              <a:t>2. Open an anaconda shell terminal (choose the Anaconda Prompt from the Start Menu in Windows)</a:t>
-            </a:r>
-            <a:endParaRPr b="0" lang="en-US" sz="1200" spc="-1" strike="noStrike">
-              <a:latin typeface="Arial"/>
-            </a:endParaRPr>
-          </a:p>
-          <a:p>
-            <a:pPr>
-              <a:lnSpc>
-                <a:spcPct val="100000"/>
-              </a:lnSpc>
-              <a:spcAft>
-                <a:spcPts val="1148"/>
-              </a:spcAft>
-            </a:pPr>
-            <a:r>
-              <a:rPr b="1" lang="en-US" sz="1200" spc="-1" strike="noStrike">
-                <a:solidFill>
-                  <a:srgbClr val="0000ff"/>
-                </a:solidFill>
-                <a:latin typeface="Arial"/>
-              </a:rPr>
-              <a:t>3. </a:t>
-            </a:r>
-            <a:r>
-              <a:rPr b="1" lang="en-US" sz="1200" spc="-1" strike="noStrike" u="sng">
-                <a:solidFill>
-                  <a:srgbClr val="0000ff"/>
-                </a:solidFill>
-                <a:uFillTx/>
-                <a:latin typeface="Arial"/>
-                <a:hlinkClick r:id="rId2"/>
-              </a:rPr>
-              <a:t>Create an environment</a:t>
-            </a:r>
-            <a:r>
-              <a:rPr b="1" lang="en-US" sz="1200" spc="-1" strike="noStrike">
-                <a:solidFill>
-                  <a:srgbClr val="0000ff"/>
-                </a:solidFill>
-                <a:latin typeface="Arial"/>
-              </a:rPr>
-              <a:t> for fastai (See </a:t>
-            </a:r>
-            <a:r>
-              <a:rPr b="1" lang="en-US" sz="1200" spc="-1" strike="noStrike" u="sng">
-                <a:solidFill>
-                  <a:srgbClr val="0000ff"/>
-                </a:solidFill>
-                <a:uFillTx/>
-                <a:latin typeface="Arial"/>
-                <a:hlinkClick r:id="rId3"/>
-              </a:rPr>
-              <a:t>https://uoa-eresearch.github.io/eresearch-cookbook/recipe/2014/11/20/conda/</a:t>
-            </a:r>
-            <a:r>
-              <a:rPr b="1" lang="en-US" sz="1200" spc="-1" strike="noStrike">
-                <a:solidFill>
-                  <a:srgbClr val="0000ff"/>
-                </a:solidFill>
-                <a:latin typeface="Arial"/>
-              </a:rPr>
-              <a:t>),</a:t>
-            </a:r>
-            <a:endParaRPr b="0" lang="en-US" sz="1200" spc="-1" strike="noStrike">
-              <a:latin typeface="Arial"/>
-            </a:endParaRPr>
-          </a:p>
-          <a:p>
-            <a:pPr>
-              <a:lnSpc>
-                <a:spcPct val="100000"/>
-              </a:lnSpc>
-              <a:spcAft>
-                <a:spcPts val="1148"/>
-              </a:spcAft>
-            </a:pPr>
-            <a:r>
-              <a:rPr b="1" lang="en-US" sz="1200" spc="-1" strike="noStrike">
-                <a:solidFill>
-                  <a:srgbClr val="0000ff"/>
-                </a:solidFill>
-                <a:latin typeface="Arial"/>
-              </a:rPr>
-              <a:t>    </a:t>
-            </a:r>
-            <a:r>
-              <a:rPr b="1" lang="en-US" sz="1200" spc="-1" strike="noStrike">
-                <a:solidFill>
-                  <a:srgbClr val="0000ff"/>
-                </a:solidFill>
-                <a:latin typeface="Arial"/>
-              </a:rPr>
-              <a:t>then activate that environment:</a:t>
-            </a:r>
-            <a:endParaRPr b="0" lang="en-US" sz="1200" spc="-1" strike="noStrike">
-              <a:latin typeface="Arial"/>
-            </a:endParaRPr>
-          </a:p>
-          <a:p>
-            <a:pPr>
-              <a:lnSpc>
-                <a:spcPct val="100000"/>
-              </a:lnSpc>
-              <a:spcAft>
-                <a:spcPts val="1148"/>
-              </a:spcAft>
-            </a:pPr>
-            <a:r>
-              <a:rPr b="1" lang="en-US" sz="1200" spc="-1" strike="noStrike">
-                <a:solidFill>
-                  <a:srgbClr val="0000ff"/>
-                </a:solidFill>
-                <a:latin typeface="Lucida Console"/>
-              </a:rPr>
-              <a:t>        </a:t>
-            </a:r>
-            <a:r>
-              <a:rPr b="1" lang="en-US" sz="1200" spc="-1" strike="noStrike">
-                <a:solidFill>
-                  <a:srgbClr val="0000ff"/>
-                </a:solidFill>
-                <a:latin typeface="Lucida Console"/>
-              </a:rPr>
-              <a:t>conda create --name fastai</a:t>
-            </a:r>
-            <a:endParaRPr b="0" lang="en-US" sz="1200" spc="-1" strike="noStrike">
-              <a:latin typeface="Arial"/>
-            </a:endParaRPr>
-          </a:p>
-          <a:p>
-            <a:pPr>
-              <a:lnSpc>
-                <a:spcPct val="100000"/>
-              </a:lnSpc>
-              <a:spcAft>
-                <a:spcPts val="1148"/>
-              </a:spcAft>
-            </a:pPr>
-            <a:r>
-              <a:rPr b="1" lang="en-US" sz="1200" spc="-1" strike="noStrike">
-                <a:solidFill>
-                  <a:srgbClr val="0000ff"/>
-                </a:solidFill>
-                <a:latin typeface="Arial"/>
-              </a:rPr>
-              <a:t>                 </a:t>
-            </a:r>
-            <a:r>
-              <a:rPr b="1" lang="en-US" sz="1200" spc="-1" strike="noStrike">
-                <a:solidFill>
-                  <a:srgbClr val="0000ff"/>
-                </a:solidFill>
-                <a:latin typeface="Lucida Console"/>
-              </a:rPr>
-              <a:t>activate environment</a:t>
-            </a:r>
-            <a:endParaRPr b="0" lang="en-US" sz="1200" spc="-1" strike="noStrike">
-              <a:latin typeface="Arial"/>
-            </a:endParaRPr>
-          </a:p>
-          <a:p>
-            <a:pPr>
-              <a:lnSpc>
-                <a:spcPct val="100000"/>
-              </a:lnSpc>
-              <a:spcAft>
-                <a:spcPts val="1148"/>
-              </a:spcAft>
-            </a:pPr>
-            <a:r>
-              <a:rPr b="1" lang="en-US" sz="1200" spc="-1" strike="noStrike">
-                <a:solidFill>
-                  <a:srgbClr val="0000ff"/>
-                </a:solidFill>
-                <a:latin typeface="Arial"/>
-              </a:rPr>
-              <a:t>4. Create a fastai directory and Install the fastai library:</a:t>
-            </a:r>
-            <a:endParaRPr b="0" lang="en-US" sz="1200" spc="-1" strike="noStrike">
-              <a:latin typeface="Arial"/>
-            </a:endParaRPr>
-          </a:p>
-          <a:p>
-            <a:pPr>
-              <a:lnSpc>
-                <a:spcPct val="100000"/>
-              </a:lnSpc>
-              <a:spcAft>
-                <a:spcPts val="1148"/>
-              </a:spcAft>
-            </a:pPr>
-            <a:r>
-              <a:rPr b="1" lang="en-US" sz="1200" spc="-1" strike="noStrike">
-                <a:solidFill>
-                  <a:srgbClr val="0000ff"/>
-                </a:solidFill>
-                <a:latin typeface="Arial"/>
-              </a:rPr>
-              <a:t>                 </a:t>
-            </a:r>
-            <a:r>
-              <a:rPr b="1" lang="en-US" sz="1200" spc="-1" strike="noStrike">
-                <a:solidFill>
-                  <a:srgbClr val="0000ff"/>
-                </a:solidFill>
-                <a:latin typeface="Lucida Console"/>
-              </a:rPr>
-              <a:t>mkdir fastai</a:t>
-            </a:r>
-            <a:endParaRPr b="0" lang="en-US" sz="1200" spc="-1" strike="noStrike">
-              <a:latin typeface="Arial"/>
-            </a:endParaRPr>
-          </a:p>
-          <a:p>
-            <a:pPr>
-              <a:lnSpc>
-                <a:spcPct val="100000"/>
-              </a:lnSpc>
-              <a:spcAft>
-                <a:spcPts val="1148"/>
-              </a:spcAft>
-            </a:pPr>
-            <a:r>
-              <a:rPr b="1" lang="en-US" sz="1200" spc="-1" strike="noStrike">
-                <a:solidFill>
-                  <a:srgbClr val="0000ff"/>
-                </a:solidFill>
-                <a:latin typeface="Lucida Console"/>
-              </a:rPr>
-              <a:t>        </a:t>
-            </a:r>
-            <a:r>
-              <a:rPr b="1" lang="en-US" sz="1200" spc="-1" strike="noStrike">
-                <a:solidFill>
-                  <a:srgbClr val="0000ff"/>
-                </a:solidFill>
-                <a:latin typeface="Lucida Console"/>
-              </a:rPr>
-              <a:t>conda install -c pytorch -c fastai fastai</a:t>
-            </a:r>
-            <a:endParaRPr b="0" lang="en-US" sz="1200" spc="-1" strike="noStrike">
-              <a:latin typeface="Arial"/>
-            </a:endParaRPr>
-          </a:p>
-          <a:p>
-            <a:pPr>
-              <a:lnSpc>
-                <a:spcPct val="100000"/>
-              </a:lnSpc>
-              <a:spcAft>
-                <a:spcPts val="1148"/>
-              </a:spcAft>
-            </a:pPr>
-            <a:r>
-              <a:rPr b="1" lang="en-US" sz="1200" spc="-1" strike="noStrike">
-                <a:solidFill>
-                  <a:srgbClr val="0000ff"/>
-                </a:solidFill>
-                <a:latin typeface="Arial"/>
-              </a:rPr>
-              <a:t>5. Make a local copy of the fastai </a:t>
-            </a:r>
-            <a:r>
-              <a:rPr b="1" lang="en-US" sz="1200" spc="-1" strike="noStrike">
-                <a:solidFill>
-                  <a:srgbClr val="0000ff"/>
-                </a:solidFill>
-                <a:latin typeface="Lucida Console"/>
-              </a:rPr>
-              <a:t>course-nlp</a:t>
-            </a:r>
-            <a:r>
-              <a:rPr b="1" lang="en-US" sz="1200" spc="-1" strike="noStrike">
-                <a:solidFill>
-                  <a:srgbClr val="0000ff"/>
-                </a:solidFill>
-                <a:latin typeface="Arial"/>
-              </a:rPr>
-              <a:t> repository:</a:t>
-            </a:r>
-            <a:endParaRPr b="0" lang="en-US" sz="1200" spc="-1" strike="noStrike">
-              <a:latin typeface="Arial"/>
-            </a:endParaRPr>
-          </a:p>
-          <a:p>
-            <a:pPr>
-              <a:lnSpc>
-                <a:spcPct val="100000"/>
-              </a:lnSpc>
-              <a:spcAft>
-                <a:spcPts val="1148"/>
-              </a:spcAft>
-            </a:pPr>
-            <a:r>
-              <a:rPr b="1" lang="en-US" sz="1200" spc="-1" strike="noStrike">
-                <a:solidFill>
-                  <a:srgbClr val="0000ff"/>
-                </a:solidFill>
-                <a:latin typeface="Arial"/>
-              </a:rPr>
-              <a:t>                 </a:t>
-            </a:r>
-            <a:r>
-              <a:rPr b="1" lang="en-US" sz="1200" spc="-1" strike="noStrike">
-                <a:solidFill>
-                  <a:srgbClr val="0000ff"/>
-                </a:solidFill>
-                <a:latin typeface="Lucida Console"/>
-              </a:rPr>
-              <a:t>cd fastai</a:t>
-            </a:r>
-            <a:endParaRPr b="0" lang="en-US" sz="1200" spc="-1" strike="noStrike">
-              <a:latin typeface="Arial"/>
-            </a:endParaRPr>
-          </a:p>
-          <a:p>
-            <a:pPr>
-              <a:lnSpc>
-                <a:spcPct val="100000"/>
-              </a:lnSpc>
-              <a:spcAft>
-                <a:spcPts val="1148"/>
-              </a:spcAft>
-            </a:pPr>
-            <a:r>
-              <a:rPr b="1" lang="en-US" sz="1200" spc="-1" strike="noStrike">
-                <a:solidFill>
-                  <a:srgbClr val="0000ff"/>
-                </a:solidFill>
-                <a:latin typeface="Lucida Sans Unicode"/>
-              </a:rPr>
-              <a:t>               </a:t>
-            </a:r>
-            <a:r>
-              <a:rPr b="1" lang="en-US" sz="1200" spc="-1" strike="noStrike">
-                <a:solidFill>
-                  <a:srgbClr val="0000ff"/>
-                </a:solidFill>
-                <a:latin typeface="Lucida Console"/>
-              </a:rPr>
-              <a:t>git clone </a:t>
-            </a:r>
-            <a:r>
-              <a:rPr b="1" lang="en-US" sz="1200" spc="-1" strike="noStrike" u="sng">
-                <a:solidFill>
-                  <a:srgbClr val="0000ff"/>
-                </a:solidFill>
-                <a:uFillTx/>
-                <a:latin typeface="Lucida Console"/>
-                <a:hlinkClick r:id="rId4"/>
-              </a:rPr>
-              <a:t>https://github.com/fastai/course-nlp.git</a:t>
-            </a:r>
-            <a:endParaRPr b="0" lang="en-US" sz="1200" spc="-1" strike="noStrike">
-              <a:latin typeface="Arial"/>
-            </a:endParaRPr>
-          </a:p>
-          <a:p>
-            <a:pPr>
-              <a:lnSpc>
-                <a:spcPct val="100000"/>
-              </a:lnSpc>
-              <a:spcAft>
-                <a:spcPts val="1148"/>
-              </a:spcAft>
-            </a:pPr>
-            <a:r>
-              <a:rPr b="0" lang="en-US" sz="1200" spc="-1" strike="noStrike">
-                <a:solidFill>
-                  <a:srgbClr val="0000ff"/>
-                </a:solidFill>
-                <a:latin typeface="Lucida Sans Unicode"/>
-              </a:rPr>
-              <a:t>           </a:t>
-            </a:r>
-            <a:endParaRPr b="0" lang="en-US" sz="1200" spc="-1" strike="noStrike">
-              <a:latin typeface="Arial"/>
-            </a:endParaRPr>
-          </a:p>
-          <a:p>
-            <a:pPr>
-              <a:lnSpc>
-                <a:spcPct val="100000"/>
-              </a:lnSpc>
-              <a:spcAft>
-                <a:spcPts val="1148"/>
-              </a:spcAft>
-            </a:pPr>
-            <a:r>
-              <a:rPr b="0" lang="en-US" sz="1200" spc="-1" strike="noStrike">
-                <a:solidFill>
-                  <a:srgbClr val="0000ff"/>
-                </a:solidFill>
-                <a:latin typeface="Lucida Sans Unicode"/>
-              </a:rPr>
-              <a:t>                </a:t>
-            </a:r>
-            <a:endParaRPr b="0" lang="en-US" sz="1200" spc="-1" strike="noStrike">
-              <a:latin typeface="Arial"/>
-            </a:endParaRPr>
-          </a:p>
-        </p:txBody>
-      </p:sp>
+      </p:pic>
     </p:spTree>
   </p:cSld>
   <mc:AlternateContent>
@@ -5005,14 +5417,14 @@
       </p:grpSpPr>
       <p:sp>
         <p:nvSpPr>
-          <p:cNvPr id="90" name="CustomShape 1"/>
-          <p:cNvSpPr/>
+          <p:cNvPr id="90" name="TextShape 1"/>
+          <p:cNvSpPr txBox="1"/>
           <p:nvPr/>
         </p:nvSpPr>
         <p:spPr>
           <a:xfrm>
-            <a:off x="504000" y="411480"/>
-            <a:ext cx="7019640" cy="544320"/>
+            <a:off x="504000" y="59040"/>
+            <a:ext cx="7019640" cy="1250280"/>
           </a:xfrm>
           <a:prstGeom prst="rect">
             <a:avLst/>
@@ -5022,41 +5434,28 @@
             <a:noFill/>
           </a:ln>
         </p:spPr>
-        <p:style>
-          <a:lnRef idx="0"/>
-          <a:fillRef idx="0"/>
-          <a:effectRef idx="0"/>
-          <a:fontRef idx="minor"/>
-        </p:style>
         <p:txBody>
           <a:bodyPr lIns="0" rIns="0" tIns="0" bIns="0" anchor="ctr">
             <a:spAutoFit/>
           </a:bodyPr>
           <a:p>
-            <a:pPr>
-              <a:lnSpc>
-                <a:spcPct val="100000"/>
-              </a:lnSpc>
-            </a:pPr>
-            <a:r>
-              <a:rPr b="0" lang="en-US" sz="3570" spc="-1" strike="noStrike">
-                <a:solidFill>
-                  <a:srgbClr val="ffffff"/>
-                </a:solidFill>
-                <a:latin typeface="Arial"/>
-              </a:rPr>
-              <a:t>Running a course notebook</a:t>
-            </a:r>
-            <a:endParaRPr b="0" lang="en-US" sz="3570" spc="-1" strike="noStrike">
-              <a:latin typeface="Arial"/>
-            </a:endParaRPr>
-          </a:p>
-        </p:txBody>
-      </p:sp>
-      <p:sp>
-        <p:nvSpPr>
-          <p:cNvPr id="91" name="CustomShape 2"/>
-          <p:cNvSpPr/>
+            <a:pPr algn="ctr"/>
+            <a:r>
+              <a:rPr b="0" lang="en-US" sz="4400" spc="-1" strike="noStrike">
+                <a:latin typeface="Arial"/>
+              </a:rPr>
+              <a:t>Non-negative Matrix Factorization</a:t>
+            </a:r>
+            <a:endParaRPr b="0" lang="en-US" sz="4400" spc="-1" strike="noStrike">
+              <a:latin typeface="Arial"/>
+            </a:endParaRPr>
+          </a:p>
+        </p:txBody>
+      </p:sp>
+      <p:sp>
+        <p:nvSpPr>
+          <p:cNvPr id="91" name="TextShape 2"/>
+          <p:cNvSpPr txBox="1"/>
           <p:nvPr/>
         </p:nvSpPr>
         <p:spPr>
@@ -5072,219 +5471,205 @@
             <a:noFill/>
           </a:ln>
         </p:spPr>
-        <p:style>
-          <a:lnRef idx="0"/>
-          <a:fillRef idx="0"/>
-          <a:effectRef idx="0"/>
-          <a:fontRef idx="minor"/>
-        </p:style>
         <p:txBody>
           <a:bodyPr lIns="0" rIns="0" tIns="0" bIns="0">
-            <a:normAutofit fontScale="51000"/>
-          </a:bodyPr>
-          <a:p>
-            <a:pPr>
-              <a:lnSpc>
-                <a:spcPct val="100000"/>
-              </a:lnSpc>
+            <a:normAutofit/>
+          </a:bodyPr>
+          <a:p>
+            <a:pPr marL="432000" indent="-324000">
+              <a:spcBef>
+                <a:spcPts val="1417"/>
+              </a:spcBef>
+              <a:buClr>
+                <a:srgbClr val="000000"/>
+              </a:buClr>
+              <a:buSzPct val="45000"/>
+              <a:buFont typeface="Wingdings" charset="2"/>
+              <a:buChar char=""/>
             </a:pPr>
             <a:r>
-              <a:rPr b="1" lang="en-US" sz="2600" spc="-1" strike="noStrike">
-                <a:latin typeface="Arial"/>
-              </a:rPr>
-              <a:t>1. Open an anaconda shell, with the Anaconda Prompt</a:t>
-            </a:r>
-            <a:endParaRPr b="0" lang="en-US" sz="2600" spc="-1" strike="noStrike">
-              <a:latin typeface="Arial"/>
-            </a:endParaRPr>
-          </a:p>
-          <a:p>
-            <a:pPr>
-              <a:lnSpc>
-                <a:spcPct val="100000"/>
-              </a:lnSpc>
-            </a:pPr>
-            <a:r>
-              <a:rPr b="1" lang="en-US" sz="2600" spc="-1" strike="noStrike">
-                <a:latin typeface="Arial"/>
-              </a:rPr>
-              <a:t>2. Activate the fastai environment</a:t>
-            </a:r>
-            <a:endParaRPr b="0" lang="en-US" sz="2600" spc="-1" strike="noStrike">
-              <a:latin typeface="Arial"/>
-            </a:endParaRPr>
-          </a:p>
-          <a:p>
-            <a:pPr>
-              <a:lnSpc>
-                <a:spcPct val="100000"/>
-              </a:lnSpc>
-            </a:pPr>
-            <a:r>
-              <a:rPr b="1" lang="en-US" sz="2600" spc="-1" strike="noStrike">
-                <a:latin typeface="Arial"/>
-              </a:rPr>
-              <a:t>    </a:t>
-            </a:r>
-            <a:r>
-              <a:rPr b="1" lang="en-US" sz="2600" spc="-1" strike="noStrike">
-                <a:latin typeface="Lucida Console"/>
-              </a:rPr>
-              <a:t>activate fastai</a:t>
-            </a:r>
-            <a:endParaRPr b="0" lang="en-US" sz="2600" spc="-1" strike="noStrike">
-              <a:latin typeface="Arial"/>
-            </a:endParaRPr>
-          </a:p>
-          <a:p>
-            <a:pPr>
-              <a:lnSpc>
-                <a:spcPct val="100000"/>
-              </a:lnSpc>
-            </a:pPr>
-            <a:r>
-              <a:rPr b="1" lang="en-US" sz="2600" spc="-1" strike="noStrike">
-                <a:latin typeface="Arial"/>
-              </a:rPr>
-              <a:t>2. Go to your local copy of the course repository </a:t>
-            </a:r>
-            <a:endParaRPr b="0" lang="en-US" sz="2600" spc="-1" strike="noStrike">
-              <a:latin typeface="Arial"/>
-            </a:endParaRPr>
-          </a:p>
-          <a:p>
-            <a:pPr>
-              <a:lnSpc>
-                <a:spcPct val="100000"/>
-              </a:lnSpc>
-            </a:pPr>
-            <a:r>
-              <a:rPr b="1" lang="en-US" sz="2600" spc="-1" strike="noStrike">
-                <a:latin typeface="Lucida Console"/>
-              </a:rPr>
-              <a:t>  </a:t>
-            </a:r>
-            <a:r>
-              <a:rPr b="1" lang="en-US" sz="2600" spc="-1" strike="noStrike">
-                <a:latin typeface="Lucida Console"/>
-              </a:rPr>
-              <a:t>cd fastai/course-nlp/</a:t>
-            </a:r>
-            <a:endParaRPr b="0" lang="en-US" sz="2600" spc="-1" strike="noStrike">
-              <a:latin typeface="Arial"/>
-            </a:endParaRPr>
-          </a:p>
-          <a:p>
-            <a:pPr>
-              <a:lnSpc>
-                <a:spcPct val="100000"/>
-              </a:lnSpc>
-            </a:pPr>
-            <a:r>
-              <a:rPr b="1" lang="en-US" sz="2600" spc="-1" strike="noStrike">
-                <a:latin typeface="Arial"/>
-              </a:rPr>
-              <a:t>3. Run the command</a:t>
-            </a:r>
-            <a:endParaRPr b="0" lang="en-US" sz="2600" spc="-1" strike="noStrike">
-              <a:latin typeface="Arial"/>
-            </a:endParaRPr>
-          </a:p>
-          <a:p>
-            <a:pPr>
-              <a:lnSpc>
-                <a:spcPct val="100000"/>
-              </a:lnSpc>
-            </a:pPr>
-            <a:r>
-              <a:rPr b="1" lang="en-US" sz="2600" spc="-1" strike="noStrike">
-                <a:latin typeface="Lucida Console"/>
-              </a:rPr>
-              <a:t>  </a:t>
-            </a:r>
-            <a:r>
-              <a:rPr b="1" lang="en-US" sz="2600" spc="-1" strike="noStrike">
-                <a:latin typeface="Lucida Console"/>
-              </a:rPr>
-              <a:t>jupyter notebook</a:t>
-            </a:r>
-            <a:endParaRPr b="0" lang="en-US" sz="2600" spc="-1" strike="noStrike">
-              <a:latin typeface="Arial"/>
-            </a:endParaRPr>
-          </a:p>
-          <a:p>
-            <a:pPr>
-              <a:lnSpc>
-                <a:spcPct val="100000"/>
-              </a:lnSpc>
-            </a:pPr>
-            <a:r>
-              <a:rPr b="1" lang="en-US" sz="2600" spc="-1" strike="noStrike">
-                <a:latin typeface="Arial"/>
-              </a:rPr>
-              <a:t>    </a:t>
-            </a:r>
-            <a:r>
-              <a:rPr b="1" lang="en-US" sz="2600" spc="-1" strike="noStrike">
-                <a:latin typeface="Arial"/>
-              </a:rPr>
-              <a:t>A new browser tab will open, with links to the course notebooks in the repository </a:t>
-            </a:r>
-            <a:endParaRPr b="0" lang="en-US" sz="2600" spc="-1" strike="noStrike">
-              <a:latin typeface="Arial"/>
-            </a:endParaRPr>
-          </a:p>
-          <a:p>
-            <a:pPr>
-              <a:lnSpc>
-                <a:spcPct val="100000"/>
-              </a:lnSpc>
-            </a:pPr>
-            <a:r>
-              <a:rPr b="1" lang="en-US" sz="2600" spc="-1" strike="noStrike">
-                <a:latin typeface="Arial"/>
-              </a:rPr>
-              <a:t>4. Clicking on a selected notebook link opens that notebook in a separate browser tab</a:t>
-            </a:r>
-            <a:endParaRPr b="0" lang="en-US" sz="2600" spc="-1" strike="noStrike">
-              <a:latin typeface="Arial"/>
-            </a:endParaRPr>
-          </a:p>
-          <a:p>
-            <a:pPr>
-              <a:lnSpc>
-                <a:spcPct val="100000"/>
-              </a:lnSpc>
-            </a:pPr>
-            <a:r>
-              <a:rPr b="1" lang="en-US" sz="2600" spc="-1" strike="noStrike">
-                <a:latin typeface="Arial"/>
-              </a:rPr>
-              <a:t>5. We’ll cover the notebook </a:t>
-            </a:r>
-            <a:r>
-              <a:rPr b="1" lang="en-US" sz="2600" spc="-1" strike="noStrike">
-                <a:latin typeface="Lucida Console"/>
-              </a:rPr>
-              <a:t>2-svd-nmf-topic-modeling</a:t>
-            </a:r>
-            <a:r>
-              <a:rPr b="1" lang="en-US" sz="2600" spc="-1" strike="noStrike">
-                <a:latin typeface="Arial"/>
-              </a:rPr>
-              <a:t> next week. Click on it and verify that you can run the code blocks within it.</a:t>
-            </a:r>
-            <a:endParaRPr b="0" lang="en-US" sz="2600" spc="-1" strike="noStrike">
-              <a:latin typeface="Arial"/>
-            </a:endParaRPr>
-          </a:p>
-          <a:p>
-            <a:pPr>
-              <a:lnSpc>
-                <a:spcPct val="100000"/>
-              </a:lnSpc>
-            </a:pPr>
-            <a:endParaRPr b="0" lang="en-US" sz="2600" spc="-1" strike="noStrike">
+              <a:rPr b="0" lang="en-US" sz="3200" spc="-1" strike="noStrike">
+                <a:latin typeface="Arial"/>
+              </a:rPr>
+              <a:t>NMF Discussion http://www.quuxlabs.com/blog/2010/09/matrix-factorization-a-simple-tutorial-and-implementation-in-python/</a:t>
+            </a:r>
+            <a:endParaRPr b="0" lang="en-US" sz="3200" spc="-1" strike="noStrike">
+              <a:latin typeface="Arial"/>
+            </a:endParaRPr>
+          </a:p>
+        </p:txBody>
+      </p:sp>
+    </p:spTree>
+  </p:cSld>
+  <mc:AlternateContent>
+    <mc:Choice Requires="p14">
+      <p:transition spd="slow" p14:dur="2000"/>
+    </mc:Choice>
+    <mc:Fallback>
+      <p:transition spd="slow"/>
+    </mc:Fallback>
+  </mc:AlternateContent>
+</p:sld>
+</file>
+
+<file path=ppt/slides/slide8.xml><?xml version="1.0" encoding="utf-8"?>
+<p:sld xmlns:a="http://schemas.openxmlformats.org/drawingml/2006/main" xmlns:p="http://schemas.openxmlformats.org/presentationml/2006/main" xmlns:r="http://schemas.openxmlformats.org/officeDocument/2006/relationships" xmlns:p14="http://schemas.microsoft.com/office/powerpoint/2010/main" xmlns:p15="http://schemas.microsoft.com/office/powerpoint/2012/main" xmlns:mc="http://schemas.openxmlformats.org/markup-compatibility/2006">
+  <p:cSld>
+    <p:spTree>
+      <p:nvGrpSpPr>
+        <p:cNvPr id="1" name=""/>
+        <p:cNvGrpSpPr/>
+        <p:nvPr/>
+      </p:nvGrpSpPr>
+      <p:grpSpPr>
+        <a:xfrm>
+          <a:off x="0" y="0"/>
+          <a:ext cx="0" cy="0"/>
+          <a:chOff x="0" y="0"/>
+          <a:chExt cx="0" cy="0"/>
+        </a:xfrm>
+      </p:grpSpPr>
+      <p:sp>
+        <p:nvSpPr>
+          <p:cNvPr id="92" name="TextShape 1"/>
+          <p:cNvSpPr txBox="1"/>
+          <p:nvPr/>
+        </p:nvSpPr>
+        <p:spPr>
+          <a:xfrm>
+            <a:off x="504000" y="210600"/>
+            <a:ext cx="7019640" cy="946800"/>
+          </a:xfrm>
+          <a:prstGeom prst="rect">
+            <a:avLst/>
+          </a:prstGeom>
+          <a:noFill/>
+          <a:ln>
+            <a:noFill/>
+          </a:ln>
+        </p:spPr>
+        <p:txBody>
+          <a:bodyPr lIns="0" rIns="0" tIns="0" bIns="0" anchor="ctr">
+            <a:spAutoFit/>
+          </a:bodyPr>
+          <a:p>
+            <a:pPr algn="ctr"/>
+            <a:r>
+              <a:rPr b="0" lang="en-US" sz="4400" spc="-1" strike="noStrike">
+                <a:latin typeface="Arial"/>
+              </a:rPr>
+              <a:t>Low-rank SVD</a:t>
+            </a:r>
+            <a:endParaRPr b="0" lang="en-US" sz="4400" spc="-1" strike="noStrike">
+              <a:latin typeface="Arial"/>
+            </a:endParaRPr>
+          </a:p>
+        </p:txBody>
+      </p:sp>
+    </p:spTree>
+  </p:cSld>
+  <mc:AlternateContent>
+    <mc:Choice Requires="p14">
+      <p:transition spd="slow" p14:dur="2000"/>
+    </mc:Choice>
+    <mc:Fallback>
+      <p:transition spd="slow"/>
+    </mc:Fallback>
+  </mc:AlternateContent>
+</p:sld>
+</file>
+
+<file path=ppt/slides/slide9.xml><?xml version="1.0" encoding="utf-8"?>
+<p:sld xmlns:a="http://schemas.openxmlformats.org/drawingml/2006/main" xmlns:p="http://schemas.openxmlformats.org/presentationml/2006/main" xmlns:r="http://schemas.openxmlformats.org/officeDocument/2006/relationships" xmlns:p14="http://schemas.microsoft.com/office/powerpoint/2010/main" xmlns:p15="http://schemas.microsoft.com/office/powerpoint/2012/main" xmlns:mc="http://schemas.openxmlformats.org/markup-compatibility/2006">
+  <p:cSld>
+    <p:spTree>
+      <p:nvGrpSpPr>
+        <p:cNvPr id="1" name=""/>
+        <p:cNvGrpSpPr/>
+        <p:nvPr/>
+      </p:nvGrpSpPr>
+      <p:grpSpPr>
+        <a:xfrm>
+          <a:off x="0" y="0"/>
+          <a:ext cx="0" cy="0"/>
+          <a:chOff x="0" y="0"/>
+          <a:chExt cx="0" cy="0"/>
+        </a:xfrm>
+      </p:grpSpPr>
+      <p:sp>
+        <p:nvSpPr>
+          <p:cNvPr id="93" name="TextShape 1"/>
+          <p:cNvSpPr txBox="1"/>
+          <p:nvPr/>
+        </p:nvSpPr>
+        <p:spPr>
+          <a:xfrm>
+            <a:off x="504000" y="210600"/>
+            <a:ext cx="7019640" cy="946800"/>
+          </a:xfrm>
+          <a:prstGeom prst="rect">
+            <a:avLst/>
+          </a:prstGeom>
+          <a:noFill/>
+          <a:ln>
+            <a:noFill/>
+          </a:ln>
+        </p:spPr>
+        <p:txBody>
+          <a:bodyPr lIns="0" rIns="0" tIns="0" bIns="0" anchor="ctr">
+            <a:spAutoFit/>
+          </a:bodyPr>
+          <a:p>
+            <a:pPr algn="ctr"/>
+            <a:r>
+              <a:rPr b="0" lang="en-US" sz="4400" spc="-1" strike="noStrike">
+                <a:latin typeface="Arial"/>
+              </a:rPr>
+              <a:t>Low rank SVD</a:t>
+            </a:r>
+            <a:endParaRPr b="0" lang="en-US" sz="4400" spc="-1" strike="noStrike">
+              <a:latin typeface="Arial"/>
+            </a:endParaRPr>
+          </a:p>
+        </p:txBody>
+      </p:sp>
+      <p:sp>
+        <p:nvSpPr>
+          <p:cNvPr id="94" name="TextShape 2"/>
+          <p:cNvSpPr txBox="1"/>
+          <p:nvPr/>
+        </p:nvSpPr>
+        <p:spPr>
+          <a:xfrm>
+            <a:off x="504000" y="1368000"/>
+            <a:ext cx="9071640" cy="3287880"/>
+          </a:xfrm>
+          <a:prstGeom prst="rect">
+            <a:avLst/>
+          </a:prstGeom>
+          <a:noFill/>
+          <a:ln>
+            <a:noFill/>
+          </a:ln>
+        </p:spPr>
+        <p:txBody>
+          <a:bodyPr lIns="0" rIns="0" tIns="0" bIns="0">
+            <a:normAutofit/>
+          </a:bodyPr>
+          <a:p>
+            <a:r>
+              <a:rPr b="0" lang="en-US" sz="3200" spc="-1" strike="noStrike">
+                <a:latin typeface="Arial"/>
+                <a:hlinkClick r:id="rId1"/>
+              </a:rPr>
+              <a:t>https://research.fb.com/fast-randomized-svd/</a:t>
+            </a:r>
+            <a:endParaRPr b="0" lang="en-US" sz="3200" spc="-1" strike="noStrike">
+              <a:latin typeface="Arial"/>
+            </a:endParaRPr>
+          </a:p>
+          <a:p>
+            <a:endParaRPr b="0" lang="en-US" sz="3200" spc="-1" strike="noStrike">
               <a:latin typeface="Arial"/>
             </a:endParaRPr>
           </a:p>

</xml_diff>